<commit_message>
4.20 supplement inverse transform sampling
</commit_message>
<xml_diff>
--- a/src/raw/RawFigure.pptx
+++ b/src/raw/RawFigure.pptx
@@ -6,6 +6,7 @@
   </p:sldMasterIdLst>
   <p:sldIdLst>
     <p:sldId id="256" r:id="rId2"/>
+    <p:sldId id="257" r:id="rId3"/>
   </p:sldIdLst>
   <p:sldSz cx="12192000" cy="6858000"/>
   <p:notesSz cx="6858000" cy="9144000"/>
@@ -259,7 +260,7 @@
           <a:p>
             <a:fld id="{4D4988A0-7A80-4B0D-9F1E-5E5F806F686B}" type="datetimeFigureOut">
               <a:rPr lang="zh-CN" altLang="en-US" smtClean="0"/>
-              <a:t>2023/4/9</a:t>
+              <a:t>2023/4/23</a:t>
             </a:fld>
             <a:endParaRPr lang="zh-CN" altLang="en-US"/>
           </a:p>
@@ -457,7 +458,7 @@
           <a:p>
             <a:fld id="{4D4988A0-7A80-4B0D-9F1E-5E5F806F686B}" type="datetimeFigureOut">
               <a:rPr lang="zh-CN" altLang="en-US" smtClean="0"/>
-              <a:t>2023/4/9</a:t>
+              <a:t>2023/4/23</a:t>
             </a:fld>
             <a:endParaRPr lang="zh-CN" altLang="en-US"/>
           </a:p>
@@ -665,7 +666,7 @@
           <a:p>
             <a:fld id="{4D4988A0-7A80-4B0D-9F1E-5E5F806F686B}" type="datetimeFigureOut">
               <a:rPr lang="zh-CN" altLang="en-US" smtClean="0"/>
-              <a:t>2023/4/9</a:t>
+              <a:t>2023/4/23</a:t>
             </a:fld>
             <a:endParaRPr lang="zh-CN" altLang="en-US"/>
           </a:p>
@@ -863,7 +864,7 @@
           <a:p>
             <a:fld id="{4D4988A0-7A80-4B0D-9F1E-5E5F806F686B}" type="datetimeFigureOut">
               <a:rPr lang="zh-CN" altLang="en-US" smtClean="0"/>
-              <a:t>2023/4/9</a:t>
+              <a:t>2023/4/23</a:t>
             </a:fld>
             <a:endParaRPr lang="zh-CN" altLang="en-US"/>
           </a:p>
@@ -1138,7 +1139,7 @@
           <a:p>
             <a:fld id="{4D4988A0-7A80-4B0D-9F1E-5E5F806F686B}" type="datetimeFigureOut">
               <a:rPr lang="zh-CN" altLang="en-US" smtClean="0"/>
-              <a:t>2023/4/9</a:t>
+              <a:t>2023/4/23</a:t>
             </a:fld>
             <a:endParaRPr lang="zh-CN" altLang="en-US"/>
           </a:p>
@@ -1403,7 +1404,7 @@
           <a:p>
             <a:fld id="{4D4988A0-7A80-4B0D-9F1E-5E5F806F686B}" type="datetimeFigureOut">
               <a:rPr lang="zh-CN" altLang="en-US" smtClean="0"/>
-              <a:t>2023/4/9</a:t>
+              <a:t>2023/4/23</a:t>
             </a:fld>
             <a:endParaRPr lang="zh-CN" altLang="en-US"/>
           </a:p>
@@ -1815,7 +1816,7 @@
           <a:p>
             <a:fld id="{4D4988A0-7A80-4B0D-9F1E-5E5F806F686B}" type="datetimeFigureOut">
               <a:rPr lang="zh-CN" altLang="en-US" smtClean="0"/>
-              <a:t>2023/4/9</a:t>
+              <a:t>2023/4/23</a:t>
             </a:fld>
             <a:endParaRPr lang="zh-CN" altLang="en-US"/>
           </a:p>
@@ -1956,7 +1957,7 @@
           <a:p>
             <a:fld id="{4D4988A0-7A80-4B0D-9F1E-5E5F806F686B}" type="datetimeFigureOut">
               <a:rPr lang="zh-CN" altLang="en-US" smtClean="0"/>
-              <a:t>2023/4/9</a:t>
+              <a:t>2023/4/23</a:t>
             </a:fld>
             <a:endParaRPr lang="zh-CN" altLang="en-US"/>
           </a:p>
@@ -2069,7 +2070,7 @@
           <a:p>
             <a:fld id="{4D4988A0-7A80-4B0D-9F1E-5E5F806F686B}" type="datetimeFigureOut">
               <a:rPr lang="zh-CN" altLang="en-US" smtClean="0"/>
-              <a:t>2023/4/9</a:t>
+              <a:t>2023/4/23</a:t>
             </a:fld>
             <a:endParaRPr lang="zh-CN" altLang="en-US"/>
           </a:p>
@@ -2380,7 +2381,7 @@
           <a:p>
             <a:fld id="{4D4988A0-7A80-4B0D-9F1E-5E5F806F686B}" type="datetimeFigureOut">
               <a:rPr lang="zh-CN" altLang="en-US" smtClean="0"/>
-              <a:t>2023/4/9</a:t>
+              <a:t>2023/4/23</a:t>
             </a:fld>
             <a:endParaRPr lang="zh-CN" altLang="en-US"/>
           </a:p>
@@ -2668,7 +2669,7 @@
           <a:p>
             <a:fld id="{4D4988A0-7A80-4B0D-9F1E-5E5F806F686B}" type="datetimeFigureOut">
               <a:rPr lang="zh-CN" altLang="en-US" smtClean="0"/>
-              <a:t>2023/4/9</a:t>
+              <a:t>2023/4/23</a:t>
             </a:fld>
             <a:endParaRPr lang="zh-CN" altLang="en-US"/>
           </a:p>
@@ -2909,7 +2910,7 @@
           <a:p>
             <a:fld id="{4D4988A0-7A80-4B0D-9F1E-5E5F806F686B}" type="datetimeFigureOut">
               <a:rPr lang="zh-CN" altLang="en-US" smtClean="0"/>
-              <a:t>2023/4/9</a:t>
+              <a:t>2023/4/23</a:t>
             </a:fld>
             <a:endParaRPr lang="zh-CN" altLang="en-US"/>
           </a:p>
@@ -7938,6 +7939,3730 @@
 </p:sld>
 </file>
 
+<file path=ppt/slides/slide2.xml><?xml version="1.0" encoding="utf-8"?>
+<p:sld xmlns:a="http://schemas.openxmlformats.org/drawingml/2006/main" xmlns:r="http://schemas.openxmlformats.org/officeDocument/2006/relationships" xmlns:p="http://schemas.openxmlformats.org/presentationml/2006/main">
+  <p:cSld>
+    <p:spTree>
+      <p:nvGrpSpPr>
+        <p:cNvPr id="1" name=""/>
+        <p:cNvGrpSpPr/>
+        <p:nvPr/>
+      </p:nvGrpSpPr>
+      <p:grpSpPr>
+        <a:xfrm>
+          <a:off x="0" y="0"/>
+          <a:ext cx="0" cy="0"/>
+          <a:chOff x="0" y="0"/>
+          <a:chExt cx="0" cy="0"/>
+        </a:xfrm>
+      </p:grpSpPr>
+      <p:grpSp>
+        <p:nvGrpSpPr>
+          <p:cNvPr id="110" name="组合 109">
+            <a:extLst>
+              <a:ext uri="{FF2B5EF4-FFF2-40B4-BE49-F238E27FC236}">
+                <a16:creationId xmlns:a16="http://schemas.microsoft.com/office/drawing/2014/main" id="{FFCF8569-D387-A772-E541-6D85F2718D30}"/>
+              </a:ext>
+            </a:extLst>
+          </p:cNvPr>
+          <p:cNvGrpSpPr/>
+          <p:nvPr/>
+        </p:nvGrpSpPr>
+        <p:grpSpPr>
+          <a:xfrm>
+            <a:off x="1362536" y="1312543"/>
+            <a:ext cx="6750158" cy="2952328"/>
+            <a:chOff x="1362536" y="1312543"/>
+            <a:chExt cx="6750158" cy="2952328"/>
+          </a:xfrm>
+        </p:grpSpPr>
+        <p:sp>
+          <p:nvSpPr>
+            <p:cNvPr id="109" name="矩形 108">
+              <a:extLst>
+                <a:ext uri="{FF2B5EF4-FFF2-40B4-BE49-F238E27FC236}">
+                  <a16:creationId xmlns:a16="http://schemas.microsoft.com/office/drawing/2014/main" id="{E440B202-661B-7686-FE27-1CEF633995ED}"/>
+                </a:ext>
+              </a:extLst>
+            </p:cNvPr>
+            <p:cNvSpPr/>
+            <p:nvPr/>
+          </p:nvSpPr>
+          <p:spPr>
+            <a:xfrm>
+              <a:off x="1362536" y="1312543"/>
+              <a:ext cx="6750158" cy="2952328"/>
+            </a:xfrm>
+            <a:prstGeom prst="rect">
+              <a:avLst/>
+            </a:prstGeom>
+            <a:solidFill>
+              <a:schemeClr val="bg1"/>
+            </a:solidFill>
+            <a:ln>
+              <a:noFill/>
+            </a:ln>
+          </p:spPr>
+          <p:style>
+            <a:lnRef idx="2">
+              <a:schemeClr val="accent1">
+                <a:shade val="50000"/>
+              </a:schemeClr>
+            </a:lnRef>
+            <a:fillRef idx="1">
+              <a:schemeClr val="accent1"/>
+            </a:fillRef>
+            <a:effectRef idx="0">
+              <a:schemeClr val="accent1"/>
+            </a:effectRef>
+            <a:fontRef idx="minor">
+              <a:schemeClr val="lt1"/>
+            </a:fontRef>
+          </p:style>
+          <p:txBody>
+            <a:bodyPr rtlCol="0" anchor="ctr"/>
+            <a:lstStyle/>
+            <a:p>
+              <a:pPr algn="ctr"/>
+              <a:endParaRPr lang="zh-CN" altLang="en-US"/>
+            </a:p>
+          </p:txBody>
+        </p:sp>
+        <p:grpSp>
+          <p:nvGrpSpPr>
+            <p:cNvPr id="108" name="组合 107">
+              <a:extLst>
+                <a:ext uri="{FF2B5EF4-FFF2-40B4-BE49-F238E27FC236}">
+                  <a16:creationId xmlns:a16="http://schemas.microsoft.com/office/drawing/2014/main" id="{E06F2F6A-842D-E096-739C-A18C6CD7C31E}"/>
+                </a:ext>
+              </a:extLst>
+            </p:cNvPr>
+            <p:cNvGrpSpPr/>
+            <p:nvPr/>
+          </p:nvGrpSpPr>
+          <p:grpSpPr>
+            <a:xfrm>
+              <a:off x="1362536" y="1404578"/>
+              <a:ext cx="6677680" cy="2765958"/>
+              <a:chOff x="1362536" y="1404578"/>
+              <a:chExt cx="6677680" cy="2765958"/>
+            </a:xfrm>
+          </p:grpSpPr>
+          <p:grpSp>
+            <p:nvGrpSpPr>
+              <p:cNvPr id="107" name="组合 106">
+                <a:extLst>
+                  <a:ext uri="{FF2B5EF4-FFF2-40B4-BE49-F238E27FC236}">
+                    <a16:creationId xmlns:a16="http://schemas.microsoft.com/office/drawing/2014/main" id="{285D189D-5126-2855-CCDC-509539BC2E7B}"/>
+                  </a:ext>
+                </a:extLst>
+              </p:cNvPr>
+              <p:cNvGrpSpPr/>
+              <p:nvPr/>
+            </p:nvGrpSpPr>
+            <p:grpSpPr>
+              <a:xfrm>
+                <a:off x="4684312" y="1404578"/>
+                <a:ext cx="3355904" cy="2765958"/>
+                <a:chOff x="5447928" y="1404578"/>
+                <a:chExt cx="3355904" cy="2765958"/>
+              </a:xfrm>
+            </p:grpSpPr>
+            <p:cxnSp>
+              <p:nvCxnSpPr>
+                <p:cNvPr id="69" name="直接连接符 68">
+                  <a:extLst>
+                    <a:ext uri="{FF2B5EF4-FFF2-40B4-BE49-F238E27FC236}">
+                      <a16:creationId xmlns:a16="http://schemas.microsoft.com/office/drawing/2014/main" id="{905DCF0D-1531-EF84-4705-ABFAE3C25009}"/>
+                    </a:ext>
+                  </a:extLst>
+                </p:cNvPr>
+                <p:cNvCxnSpPr>
+                  <a:cxnSpLocks/>
+                </p:cNvCxnSpPr>
+                <p:nvPr/>
+              </p:nvCxnSpPr>
+              <p:spPr>
+                <a:xfrm flipV="1">
+                  <a:off x="6527110" y="3425825"/>
+                  <a:ext cx="0" cy="430213"/>
+                </a:xfrm>
+                <a:prstGeom prst="line">
+                  <a:avLst/>
+                </a:prstGeom>
+                <a:ln w="12700">
+                  <a:solidFill>
+                    <a:schemeClr val="tx1"/>
+                  </a:solidFill>
+                  <a:prstDash val="dash"/>
+                </a:ln>
+              </p:spPr>
+              <p:style>
+                <a:lnRef idx="1">
+                  <a:schemeClr val="dk1"/>
+                </a:lnRef>
+                <a:fillRef idx="0">
+                  <a:schemeClr val="dk1"/>
+                </a:fillRef>
+                <a:effectRef idx="0">
+                  <a:schemeClr val="dk1"/>
+                </a:effectRef>
+                <a:fontRef idx="minor">
+                  <a:schemeClr val="tx1"/>
+                </a:fontRef>
+              </p:style>
+            </p:cxnSp>
+            <p:cxnSp>
+              <p:nvCxnSpPr>
+                <p:cNvPr id="65" name="直接连接符 64">
+                  <a:extLst>
+                    <a:ext uri="{FF2B5EF4-FFF2-40B4-BE49-F238E27FC236}">
+                      <a16:creationId xmlns:a16="http://schemas.microsoft.com/office/drawing/2014/main" id="{7B81A70D-22DD-1DFD-9C06-4A8DCE93C29B}"/>
+                    </a:ext>
+                  </a:extLst>
+                </p:cNvPr>
+                <p:cNvCxnSpPr>
+                  <a:cxnSpLocks/>
+                </p:cNvCxnSpPr>
+                <p:nvPr/>
+              </p:nvCxnSpPr>
+              <p:spPr>
+                <a:xfrm flipV="1">
+                  <a:off x="7027770" y="2344738"/>
+                  <a:ext cx="0" cy="364182"/>
+                </a:xfrm>
+                <a:prstGeom prst="line">
+                  <a:avLst/>
+                </a:prstGeom>
+                <a:ln w="12700">
+                  <a:solidFill>
+                    <a:schemeClr val="tx1"/>
+                  </a:solidFill>
+                  <a:prstDash val="dash"/>
+                </a:ln>
+              </p:spPr>
+              <p:style>
+                <a:lnRef idx="1">
+                  <a:schemeClr val="dk1"/>
+                </a:lnRef>
+                <a:fillRef idx="0">
+                  <a:schemeClr val="dk1"/>
+                </a:fillRef>
+                <a:effectRef idx="0">
+                  <a:schemeClr val="dk1"/>
+                </a:effectRef>
+                <a:fontRef idx="minor">
+                  <a:schemeClr val="tx1"/>
+                </a:fontRef>
+              </p:style>
+            </p:cxnSp>
+            <p:cxnSp>
+              <p:nvCxnSpPr>
+                <p:cNvPr id="3" name="直接箭头连接符 2">
+                  <a:extLst>
+                    <a:ext uri="{FF2B5EF4-FFF2-40B4-BE49-F238E27FC236}">
+                      <a16:creationId xmlns:a16="http://schemas.microsoft.com/office/drawing/2014/main" id="{F687AEA6-FD2B-2ECE-307E-8ABDBA6185D3}"/>
+                    </a:ext>
+                  </a:extLst>
+                </p:cNvPr>
+                <p:cNvCxnSpPr>
+                  <a:cxnSpLocks/>
+                </p:cNvCxnSpPr>
+                <p:nvPr/>
+              </p:nvCxnSpPr>
+              <p:spPr>
+                <a:xfrm flipV="1">
+                  <a:off x="6096000" y="1628552"/>
+                  <a:ext cx="0" cy="2541984"/>
+                </a:xfrm>
+                <a:prstGeom prst="straightConnector1">
+                  <a:avLst/>
+                </a:prstGeom>
+                <a:ln w="12700">
+                  <a:tailEnd type="triangle"/>
+                </a:ln>
+              </p:spPr>
+              <p:style>
+                <a:lnRef idx="1">
+                  <a:schemeClr val="dk1"/>
+                </a:lnRef>
+                <a:fillRef idx="0">
+                  <a:schemeClr val="dk1"/>
+                </a:fillRef>
+                <a:effectRef idx="0">
+                  <a:schemeClr val="dk1"/>
+                </a:effectRef>
+                <a:fontRef idx="minor">
+                  <a:schemeClr val="tx1"/>
+                </a:fontRef>
+              </p:style>
+            </p:cxnSp>
+            <p:cxnSp>
+              <p:nvCxnSpPr>
+                <p:cNvPr id="4" name="直接箭头连接符 3">
+                  <a:extLst>
+                    <a:ext uri="{FF2B5EF4-FFF2-40B4-BE49-F238E27FC236}">
+                      <a16:creationId xmlns:a16="http://schemas.microsoft.com/office/drawing/2014/main" id="{AA150C27-B2A1-C0EC-1294-6D6353CE68D6}"/>
+                    </a:ext>
+                  </a:extLst>
+                </p:cNvPr>
+                <p:cNvCxnSpPr>
+                  <a:cxnSpLocks/>
+                </p:cNvCxnSpPr>
+                <p:nvPr/>
+              </p:nvCxnSpPr>
+              <p:spPr>
+                <a:xfrm>
+                  <a:off x="5807968" y="3860800"/>
+                  <a:ext cx="2808312" cy="0"/>
+                </a:xfrm>
+                <a:prstGeom prst="straightConnector1">
+                  <a:avLst/>
+                </a:prstGeom>
+                <a:ln w="12700">
+                  <a:tailEnd type="triangle"/>
+                </a:ln>
+              </p:spPr>
+              <p:style>
+                <a:lnRef idx="1">
+                  <a:schemeClr val="dk1"/>
+                </a:lnRef>
+                <a:fillRef idx="0">
+                  <a:schemeClr val="dk1"/>
+                </a:fillRef>
+                <a:effectRef idx="0">
+                  <a:schemeClr val="dk1"/>
+                </a:effectRef>
+                <a:fontRef idx="minor">
+                  <a:schemeClr val="tx1"/>
+                </a:fontRef>
+              </p:style>
+            </p:cxnSp>
+            <p:cxnSp>
+              <p:nvCxnSpPr>
+                <p:cNvPr id="6" name="直接连接符 5">
+                  <a:extLst>
+                    <a:ext uri="{FF2B5EF4-FFF2-40B4-BE49-F238E27FC236}">
+                      <a16:creationId xmlns:a16="http://schemas.microsoft.com/office/drawing/2014/main" id="{EFC624BC-9B02-F6CA-2FF6-0795F60F0DEC}"/>
+                    </a:ext>
+                  </a:extLst>
+                </p:cNvPr>
+                <p:cNvCxnSpPr>
+                  <a:cxnSpLocks/>
+                </p:cNvCxnSpPr>
+                <p:nvPr/>
+              </p:nvCxnSpPr>
+              <p:spPr>
+                <a:xfrm>
+                  <a:off x="6096000" y="3860800"/>
+                  <a:ext cx="432048" cy="0"/>
+                </a:xfrm>
+                <a:prstGeom prst="line">
+                  <a:avLst/>
+                </a:prstGeom>
+                <a:ln w="19050">
+                  <a:solidFill>
+                    <a:schemeClr val="accent1"/>
+                  </a:solidFill>
+                </a:ln>
+              </p:spPr>
+              <p:style>
+                <a:lnRef idx="1">
+                  <a:schemeClr val="dk1"/>
+                </a:lnRef>
+                <a:fillRef idx="0">
+                  <a:schemeClr val="dk1"/>
+                </a:fillRef>
+                <a:effectRef idx="0">
+                  <a:schemeClr val="dk1"/>
+                </a:effectRef>
+                <a:fontRef idx="minor">
+                  <a:schemeClr val="tx1"/>
+                </a:fontRef>
+              </p:style>
+            </p:cxnSp>
+            <p:cxnSp>
+              <p:nvCxnSpPr>
+                <p:cNvPr id="7" name="直接连接符 6">
+                  <a:extLst>
+                    <a:ext uri="{FF2B5EF4-FFF2-40B4-BE49-F238E27FC236}">
+                      <a16:creationId xmlns:a16="http://schemas.microsoft.com/office/drawing/2014/main" id="{6ACE0202-CDBE-7792-1F02-618417F5B907}"/>
+                    </a:ext>
+                  </a:extLst>
+                </p:cNvPr>
+                <p:cNvCxnSpPr>
+                  <a:cxnSpLocks/>
+                </p:cNvCxnSpPr>
+                <p:nvPr/>
+              </p:nvCxnSpPr>
+              <p:spPr>
+                <a:xfrm>
+                  <a:off x="6528617" y="3428752"/>
+                  <a:ext cx="495498" cy="0"/>
+                </a:xfrm>
+                <a:prstGeom prst="line">
+                  <a:avLst/>
+                </a:prstGeom>
+                <a:ln w="19050">
+                  <a:solidFill>
+                    <a:schemeClr val="accent1"/>
+                  </a:solidFill>
+                </a:ln>
+              </p:spPr>
+              <p:style>
+                <a:lnRef idx="1">
+                  <a:schemeClr val="dk1"/>
+                </a:lnRef>
+                <a:fillRef idx="0">
+                  <a:schemeClr val="dk1"/>
+                </a:fillRef>
+                <a:effectRef idx="0">
+                  <a:schemeClr val="dk1"/>
+                </a:effectRef>
+                <a:fontRef idx="minor">
+                  <a:schemeClr val="tx1"/>
+                </a:fontRef>
+              </p:style>
+            </p:cxnSp>
+            <p:graphicFrame>
+              <p:nvGraphicFramePr>
+                <p:cNvPr id="10" name="对象 9">
+                  <a:extLst>
+                    <a:ext uri="{FF2B5EF4-FFF2-40B4-BE49-F238E27FC236}">
+                      <a16:creationId xmlns:a16="http://schemas.microsoft.com/office/drawing/2014/main" id="{9A3A4EA4-4FF7-08AB-69B5-60B02F290DC0}"/>
+                    </a:ext>
+                  </a:extLst>
+                </p:cNvPr>
+                <p:cNvGraphicFramePr>
+                  <a:graphicFrameLocks noChangeAspect="1"/>
+                </p:cNvGraphicFramePr>
+                <p:nvPr>
+                  <p:extLst>
+                    <p:ext uri="{D42A27DB-BD31-4B8C-83A1-F6EECF244321}">
+                      <p14:modId xmlns:p14="http://schemas.microsoft.com/office/powerpoint/2010/main" val="3365978493"/>
+                    </p:ext>
+                  </p:extLst>
+                </p:nvPr>
+              </p:nvGraphicFramePr>
+              <p:xfrm>
+                <a:off x="6928810" y="3861048"/>
+                <a:ext cx="195297" cy="266314"/>
+              </p:xfrm>
+              <a:graphic>
+                <a:graphicData uri="http://schemas.openxmlformats.org/presentationml/2006/ole">
+                  <mc:AlternateContent xmlns:mc="http://schemas.openxmlformats.org/markup-compatibility/2006">
+                    <mc:Choice xmlns:v="urn:schemas-microsoft-com:vml" Requires="v">
+                      <p:oleObj name="AxMath" r:id="rId2" imgW="139320" imgH="189720" progId="Equation.AxMath">
+                        <p:embed/>
+                      </p:oleObj>
+                    </mc:Choice>
+                    <mc:Fallback>
+                      <p:oleObj name="AxMath" r:id="rId2" imgW="139320" imgH="189720" progId="Equation.AxMath">
+                        <p:embed/>
+                        <p:pic>
+                          <p:nvPicPr>
+                            <p:cNvPr id="32" name="对象 31">
+                              <a:extLst>
+                                <a:ext uri="{FF2B5EF4-FFF2-40B4-BE49-F238E27FC236}">
+                                  <a16:creationId xmlns:a16="http://schemas.microsoft.com/office/drawing/2014/main" id="{434399C6-557A-9DBF-7C4F-A6993FE2ED55}"/>
+                                </a:ext>
+                              </a:extLst>
+                            </p:cNvPr>
+                            <p:cNvPicPr/>
+                            <p:nvPr/>
+                          </p:nvPicPr>
+                          <p:blipFill>
+                            <a:blip r:embed="rId3"/>
+                            <a:stretch>
+                              <a:fillRect/>
+                            </a:stretch>
+                          </p:blipFill>
+                          <p:spPr>
+                            <a:xfrm>
+                              <a:off x="6928810" y="3861048"/>
+                              <a:ext cx="195297" cy="266314"/>
+                            </a:xfrm>
+                            <a:prstGeom prst="rect">
+                              <a:avLst/>
+                            </a:prstGeom>
+                          </p:spPr>
+                        </p:pic>
+                      </p:oleObj>
+                    </mc:Fallback>
+                  </mc:AlternateContent>
+                </a:graphicData>
+              </a:graphic>
+            </p:graphicFrame>
+            <p:graphicFrame>
+              <p:nvGraphicFramePr>
+                <p:cNvPr id="11" name="对象 10">
+                  <a:extLst>
+                    <a:ext uri="{FF2B5EF4-FFF2-40B4-BE49-F238E27FC236}">
+                      <a16:creationId xmlns:a16="http://schemas.microsoft.com/office/drawing/2014/main" id="{C038B34A-A9AF-4CEE-2DC9-9C9FB142EFAC}"/>
+                    </a:ext>
+                  </a:extLst>
+                </p:cNvPr>
+                <p:cNvGraphicFramePr>
+                  <a:graphicFrameLocks noChangeAspect="1"/>
+                </p:cNvGraphicFramePr>
+                <p:nvPr>
+                  <p:extLst>
+                    <p:ext uri="{D42A27DB-BD31-4B8C-83A1-F6EECF244321}">
+                      <p14:modId xmlns:p14="http://schemas.microsoft.com/office/powerpoint/2010/main" val="714999828"/>
+                    </p:ext>
+                  </p:extLst>
+                </p:nvPr>
+              </p:nvGraphicFramePr>
+              <p:xfrm>
+                <a:off x="7439005" y="3860553"/>
+                <a:ext cx="194309" cy="274567"/>
+              </p:xfrm>
+              <a:graphic>
+                <a:graphicData uri="http://schemas.openxmlformats.org/presentationml/2006/ole">
+                  <mc:AlternateContent xmlns:mc="http://schemas.openxmlformats.org/markup-compatibility/2006">
+                    <mc:Choice xmlns:v="urn:schemas-microsoft-com:vml" Requires="v">
+                      <p:oleObj name="AxMath" r:id="rId4" imgW="134280" imgH="189720" progId="Equation.AxMath">
+                        <p:embed/>
+                      </p:oleObj>
+                    </mc:Choice>
+                    <mc:Fallback>
+                      <p:oleObj name="AxMath" r:id="rId4" imgW="134280" imgH="189720" progId="Equation.AxMath">
+                        <p:embed/>
+                        <p:pic>
+                          <p:nvPicPr>
+                            <p:cNvPr id="34" name="对象 33">
+                              <a:extLst>
+                                <a:ext uri="{FF2B5EF4-FFF2-40B4-BE49-F238E27FC236}">
+                                  <a16:creationId xmlns:a16="http://schemas.microsoft.com/office/drawing/2014/main" id="{30A8D8EB-FC14-AA02-3C36-A89974955CD0}"/>
+                                </a:ext>
+                              </a:extLst>
+                            </p:cNvPr>
+                            <p:cNvPicPr/>
+                            <p:nvPr/>
+                          </p:nvPicPr>
+                          <p:blipFill>
+                            <a:blip r:embed="rId5"/>
+                            <a:stretch>
+                              <a:fillRect/>
+                            </a:stretch>
+                          </p:blipFill>
+                          <p:spPr>
+                            <a:xfrm>
+                              <a:off x="7439005" y="3860553"/>
+                              <a:ext cx="194309" cy="274567"/>
+                            </a:xfrm>
+                            <a:prstGeom prst="rect">
+                              <a:avLst/>
+                            </a:prstGeom>
+                          </p:spPr>
+                        </p:pic>
+                      </p:oleObj>
+                    </mc:Fallback>
+                  </mc:AlternateContent>
+                </a:graphicData>
+              </a:graphic>
+            </p:graphicFrame>
+            <p:graphicFrame>
+              <p:nvGraphicFramePr>
+                <p:cNvPr id="14" name="对象 13">
+                  <a:extLst>
+                    <a:ext uri="{FF2B5EF4-FFF2-40B4-BE49-F238E27FC236}">
+                      <a16:creationId xmlns:a16="http://schemas.microsoft.com/office/drawing/2014/main" id="{E0FD5EC0-4D84-0C2A-9D4D-40D1CE99307F}"/>
+                    </a:ext>
+                  </a:extLst>
+                </p:cNvPr>
+                <p:cNvGraphicFramePr>
+                  <a:graphicFrameLocks noChangeAspect="1"/>
+                </p:cNvGraphicFramePr>
+                <p:nvPr>
+                  <p:extLst>
+                    <p:ext uri="{D42A27DB-BD31-4B8C-83A1-F6EECF244321}">
+                      <p14:modId xmlns:p14="http://schemas.microsoft.com/office/powerpoint/2010/main" val="2599977920"/>
+                    </p:ext>
+                  </p:extLst>
+                </p:nvPr>
+              </p:nvGraphicFramePr>
+              <p:xfrm>
+                <a:off x="5879976" y="1404578"/>
+                <a:ext cx="444160" cy="226730"/>
+              </p:xfrm>
+              <a:graphic>
+                <a:graphicData uri="http://schemas.openxmlformats.org/presentationml/2006/ole">
+                  <mc:AlternateContent xmlns:mc="http://schemas.openxmlformats.org/markup-compatibility/2006">
+                    <mc:Choice xmlns:v="urn:schemas-microsoft-com:vml" Requires="v">
+                      <p:oleObj name="AxMath" r:id="rId6" imgW="375120" imgH="189720" progId="Equation.AxMath">
+                        <p:embed/>
+                      </p:oleObj>
+                    </mc:Choice>
+                    <mc:Fallback>
+                      <p:oleObj name="AxMath" r:id="rId6" imgW="375120" imgH="189720" progId="Equation.AxMath">
+                        <p:embed/>
+                        <p:pic>
+                          <p:nvPicPr>
+                            <p:cNvPr id="37" name="对象 36">
+                              <a:extLst>
+                                <a:ext uri="{FF2B5EF4-FFF2-40B4-BE49-F238E27FC236}">
+                                  <a16:creationId xmlns:a16="http://schemas.microsoft.com/office/drawing/2014/main" id="{2EBA2B6F-2EB2-4D02-48F2-80605E5DC11E}"/>
+                                </a:ext>
+                              </a:extLst>
+                            </p:cNvPr>
+                            <p:cNvPicPr/>
+                            <p:nvPr/>
+                          </p:nvPicPr>
+                          <p:blipFill>
+                            <a:blip r:embed="rId7"/>
+                            <a:stretch>
+                              <a:fillRect/>
+                            </a:stretch>
+                          </p:blipFill>
+                          <p:spPr>
+                            <a:xfrm>
+                              <a:off x="5879976" y="1404578"/>
+                              <a:ext cx="444160" cy="226730"/>
+                            </a:xfrm>
+                            <a:prstGeom prst="rect">
+                              <a:avLst/>
+                            </a:prstGeom>
+                          </p:spPr>
+                        </p:pic>
+                      </p:oleObj>
+                    </mc:Fallback>
+                  </mc:AlternateContent>
+                </a:graphicData>
+              </a:graphic>
+            </p:graphicFrame>
+            <p:sp>
+              <p:nvSpPr>
+                <p:cNvPr id="15" name="文本框 14">
+                  <a:extLst>
+                    <a:ext uri="{FF2B5EF4-FFF2-40B4-BE49-F238E27FC236}">
+                      <a16:creationId xmlns:a16="http://schemas.microsoft.com/office/drawing/2014/main" id="{6183027B-7612-6B0B-B7DE-F05638F59C8A}"/>
+                    </a:ext>
+                  </a:extLst>
+                </p:cNvPr>
+                <p:cNvSpPr txBox="1"/>
+                <p:nvPr/>
+              </p:nvSpPr>
+              <p:spPr>
+                <a:xfrm>
+                  <a:off x="5689723" y="3289380"/>
+                  <a:ext cx="453970" cy="276999"/>
+                </a:xfrm>
+                <a:prstGeom prst="rect">
+                  <a:avLst/>
+                </a:prstGeom>
+                <a:noFill/>
+              </p:spPr>
+              <p:txBody>
+                <a:bodyPr wrap="none" rtlCol="0">
+                  <a:spAutoFit/>
+                </a:bodyPr>
+                <a:lstStyle/>
+                <a:p>
+                  <a:r>
+                    <a:rPr lang="en-US" altLang="zh-CN" sz="1200" dirty="0">
+                      <a:latin typeface="Times New Roman" panose="02020603050405020304" pitchFamily="18" charset="0"/>
+                      <a:ea typeface="阿里巴巴普惠体 Medium" panose="00020600040101010101" pitchFamily="18" charset="-122"/>
+                      <a:cs typeface="Times New Roman" panose="02020603050405020304" pitchFamily="18" charset="0"/>
+                    </a:rPr>
+                    <a:t>0.25</a:t>
+                  </a:r>
+                  <a:endParaRPr lang="zh-CN" altLang="en-US" sz="1200" dirty="0">
+                    <a:latin typeface="Times New Roman" panose="02020603050405020304" pitchFamily="18" charset="0"/>
+                    <a:ea typeface="阿里巴巴普惠体 Medium" panose="00020600040101010101" pitchFamily="18" charset="-122"/>
+                    <a:cs typeface="Times New Roman" panose="02020603050405020304" pitchFamily="18" charset="0"/>
+                  </a:endParaRPr>
+                </a:p>
+              </p:txBody>
+            </p:sp>
+            <p:sp>
+              <p:nvSpPr>
+                <p:cNvPr id="17" name="文本框 16">
+                  <a:extLst>
+                    <a:ext uri="{FF2B5EF4-FFF2-40B4-BE49-F238E27FC236}">
+                      <a16:creationId xmlns:a16="http://schemas.microsoft.com/office/drawing/2014/main" id="{80300239-FAAA-370B-57EE-EC6182C3D20D}"/>
+                    </a:ext>
+                  </a:extLst>
+                </p:cNvPr>
+                <p:cNvSpPr txBox="1"/>
+                <p:nvPr/>
+              </p:nvSpPr>
+              <p:spPr>
+                <a:xfrm>
+                  <a:off x="5881064" y="3827040"/>
+                  <a:ext cx="261610" cy="276999"/>
+                </a:xfrm>
+                <a:prstGeom prst="rect">
+                  <a:avLst/>
+                </a:prstGeom>
+                <a:noFill/>
+              </p:spPr>
+              <p:txBody>
+                <a:bodyPr wrap="none" rtlCol="0">
+                  <a:spAutoFit/>
+                </a:bodyPr>
+                <a:lstStyle/>
+                <a:p>
+                  <a:r>
+                    <a:rPr lang="en-US" altLang="zh-CN" sz="1200" dirty="0">
+                      <a:latin typeface="Times New Roman" panose="02020603050405020304" pitchFamily="18" charset="0"/>
+                      <a:ea typeface="阿里巴巴普惠体 Medium" panose="00020600040101010101" pitchFamily="18" charset="-122"/>
+                      <a:cs typeface="Times New Roman" panose="02020603050405020304" pitchFamily="18" charset="0"/>
+                    </a:rPr>
+                    <a:t>0</a:t>
+                  </a:r>
+                  <a:endParaRPr lang="zh-CN" altLang="en-US" sz="1200" dirty="0">
+                    <a:latin typeface="Times New Roman" panose="02020603050405020304" pitchFamily="18" charset="0"/>
+                    <a:ea typeface="阿里巴巴普惠体 Medium" panose="00020600040101010101" pitchFamily="18" charset="-122"/>
+                    <a:cs typeface="Times New Roman" panose="02020603050405020304" pitchFamily="18" charset="0"/>
+                  </a:endParaRPr>
+                </a:p>
+              </p:txBody>
+            </p:sp>
+            <p:sp>
+              <p:nvSpPr>
+                <p:cNvPr id="18" name="文本框 17">
+                  <a:extLst>
+                    <a:ext uri="{FF2B5EF4-FFF2-40B4-BE49-F238E27FC236}">
+                      <a16:creationId xmlns:a16="http://schemas.microsoft.com/office/drawing/2014/main" id="{04F0C231-42DB-0058-6728-18DFF2663198}"/>
+                    </a:ext>
+                  </a:extLst>
+                </p:cNvPr>
+                <p:cNvSpPr txBox="1"/>
+                <p:nvPr/>
+              </p:nvSpPr>
+              <p:spPr>
+                <a:xfrm>
+                  <a:off x="5565193" y="2210131"/>
+                  <a:ext cx="579005" cy="276999"/>
+                </a:xfrm>
+                <a:prstGeom prst="rect">
+                  <a:avLst/>
+                </a:prstGeom>
+                <a:noFill/>
+              </p:spPr>
+              <p:txBody>
+                <a:bodyPr wrap="none" rtlCol="0">
+                  <a:spAutoFit/>
+                </a:bodyPr>
+                <a:lstStyle/>
+                <a:p>
+                  <a:r>
+                    <a:rPr lang="en-US" altLang="zh-CN" sz="1200" dirty="0">
+                      <a:solidFill>
+                        <a:srgbClr val="75B54A"/>
+                      </a:solidFill>
+                      <a:latin typeface="Times New Roman" panose="02020603050405020304" pitchFamily="18" charset="0"/>
+                      <a:ea typeface="阿里巴巴普惠体 Medium" panose="00020600040101010101" pitchFamily="18" charset="-122"/>
+                      <a:cs typeface="Times New Roman" panose="02020603050405020304" pitchFamily="18" charset="0"/>
+                    </a:rPr>
+                    <a:t>= 0.85</a:t>
+                  </a:r>
+                  <a:endParaRPr lang="zh-CN" altLang="en-US" sz="1200" dirty="0">
+                    <a:solidFill>
+                      <a:srgbClr val="75B54A"/>
+                    </a:solidFill>
+                    <a:latin typeface="Times New Roman" panose="02020603050405020304" pitchFamily="18" charset="0"/>
+                    <a:ea typeface="阿里巴巴普惠体 Medium" panose="00020600040101010101" pitchFamily="18" charset="-122"/>
+                    <a:cs typeface="Times New Roman" panose="02020603050405020304" pitchFamily="18" charset="0"/>
+                  </a:endParaRPr>
+                </a:p>
+              </p:txBody>
+            </p:sp>
+            <p:sp>
+              <p:nvSpPr>
+                <p:cNvPr id="19" name="文本框 18">
+                  <a:extLst>
+                    <a:ext uri="{FF2B5EF4-FFF2-40B4-BE49-F238E27FC236}">
+                      <a16:creationId xmlns:a16="http://schemas.microsoft.com/office/drawing/2014/main" id="{9C2B10FB-2133-C441-3B17-767CA213AC45}"/>
+                    </a:ext>
+                  </a:extLst>
+                </p:cNvPr>
+                <p:cNvSpPr txBox="1"/>
+                <p:nvPr/>
+              </p:nvSpPr>
+              <p:spPr>
+                <a:xfrm>
+                  <a:off x="5727406" y="1850914"/>
+                  <a:ext cx="377026" cy="276999"/>
+                </a:xfrm>
+                <a:prstGeom prst="rect">
+                  <a:avLst/>
+                </a:prstGeom>
+                <a:noFill/>
+              </p:spPr>
+              <p:txBody>
+                <a:bodyPr wrap="none" rtlCol="0">
+                  <a:spAutoFit/>
+                </a:bodyPr>
+                <a:lstStyle/>
+                <a:p>
+                  <a:r>
+                    <a:rPr lang="en-US" altLang="zh-CN" sz="1200" dirty="0">
+                      <a:latin typeface="Times New Roman" panose="02020603050405020304" pitchFamily="18" charset="0"/>
+                      <a:ea typeface="阿里巴巴普惠体 Medium" panose="00020600040101010101" pitchFamily="18" charset="-122"/>
+                      <a:cs typeface="Times New Roman" panose="02020603050405020304" pitchFamily="18" charset="0"/>
+                    </a:rPr>
+                    <a:t>1.0</a:t>
+                  </a:r>
+                  <a:endParaRPr lang="zh-CN" altLang="en-US" sz="1200" dirty="0">
+                    <a:latin typeface="Times New Roman" panose="02020603050405020304" pitchFamily="18" charset="0"/>
+                    <a:ea typeface="阿里巴巴普惠体 Medium" panose="00020600040101010101" pitchFamily="18" charset="-122"/>
+                    <a:cs typeface="Times New Roman" panose="02020603050405020304" pitchFamily="18" charset="0"/>
+                  </a:endParaRPr>
+                </a:p>
+              </p:txBody>
+            </p:sp>
+            <p:cxnSp>
+              <p:nvCxnSpPr>
+                <p:cNvPr id="20" name="直接连接符 19">
+                  <a:extLst>
+                    <a:ext uri="{FF2B5EF4-FFF2-40B4-BE49-F238E27FC236}">
+                      <a16:creationId xmlns:a16="http://schemas.microsoft.com/office/drawing/2014/main" id="{ADE3D698-9616-7F28-ABA3-F7D4E763703B}"/>
+                    </a:ext>
+                  </a:extLst>
+                </p:cNvPr>
+                <p:cNvCxnSpPr>
+                  <a:cxnSpLocks/>
+                </p:cNvCxnSpPr>
+                <p:nvPr/>
+              </p:nvCxnSpPr>
+              <p:spPr>
+                <a:xfrm flipH="1">
+                  <a:off x="6095999" y="3428752"/>
+                  <a:ext cx="432049" cy="0"/>
+                </a:xfrm>
+                <a:prstGeom prst="line">
+                  <a:avLst/>
+                </a:prstGeom>
+                <a:ln w="12700">
+                  <a:solidFill>
+                    <a:schemeClr val="tx1"/>
+                  </a:solidFill>
+                  <a:prstDash val="dash"/>
+                </a:ln>
+              </p:spPr>
+              <p:style>
+                <a:lnRef idx="1">
+                  <a:schemeClr val="dk1"/>
+                </a:lnRef>
+                <a:fillRef idx="0">
+                  <a:schemeClr val="dk1"/>
+                </a:fillRef>
+                <a:effectRef idx="0">
+                  <a:schemeClr val="dk1"/>
+                </a:effectRef>
+                <a:fontRef idx="minor">
+                  <a:schemeClr val="tx1"/>
+                </a:fontRef>
+              </p:style>
+            </p:cxnSp>
+            <p:cxnSp>
+              <p:nvCxnSpPr>
+                <p:cNvPr id="22" name="直接连接符 21">
+                  <a:extLst>
+                    <a:ext uri="{FF2B5EF4-FFF2-40B4-BE49-F238E27FC236}">
+                      <a16:creationId xmlns:a16="http://schemas.microsoft.com/office/drawing/2014/main" id="{E99204EF-9DC5-9EB1-71B9-05C55FD6204D}"/>
+                    </a:ext>
+                  </a:extLst>
+                </p:cNvPr>
+                <p:cNvCxnSpPr>
+                  <a:cxnSpLocks/>
+                </p:cNvCxnSpPr>
+                <p:nvPr/>
+              </p:nvCxnSpPr>
+              <p:spPr>
+                <a:xfrm flipH="1">
+                  <a:off x="6095999" y="1994107"/>
+                  <a:ext cx="1440161" cy="0"/>
+                </a:xfrm>
+                <a:prstGeom prst="line">
+                  <a:avLst/>
+                </a:prstGeom>
+                <a:ln w="12700">
+                  <a:solidFill>
+                    <a:schemeClr val="tx1"/>
+                  </a:solidFill>
+                  <a:prstDash val="dash"/>
+                </a:ln>
+              </p:spPr>
+              <p:style>
+                <a:lnRef idx="1">
+                  <a:schemeClr val="dk1"/>
+                </a:lnRef>
+                <a:fillRef idx="0">
+                  <a:schemeClr val="dk1"/>
+                </a:fillRef>
+                <a:effectRef idx="0">
+                  <a:schemeClr val="dk1"/>
+                </a:effectRef>
+                <a:fontRef idx="minor">
+                  <a:schemeClr val="tx1"/>
+                </a:fontRef>
+              </p:style>
+            </p:cxnSp>
+            <p:cxnSp>
+              <p:nvCxnSpPr>
+                <p:cNvPr id="27" name="直接连接符 26">
+                  <a:extLst>
+                    <a:ext uri="{FF2B5EF4-FFF2-40B4-BE49-F238E27FC236}">
+                      <a16:creationId xmlns:a16="http://schemas.microsoft.com/office/drawing/2014/main" id="{45FA619A-C08A-3B06-529F-82B8CF3686F0}"/>
+                    </a:ext>
+                  </a:extLst>
+                </p:cNvPr>
+                <p:cNvCxnSpPr>
+                  <a:cxnSpLocks/>
+                </p:cNvCxnSpPr>
+                <p:nvPr/>
+              </p:nvCxnSpPr>
+              <p:spPr>
+                <a:xfrm>
+                  <a:off x="7536160" y="1994107"/>
+                  <a:ext cx="812804" cy="0"/>
+                </a:xfrm>
+                <a:prstGeom prst="line">
+                  <a:avLst/>
+                </a:prstGeom>
+                <a:ln w="19050">
+                  <a:solidFill>
+                    <a:schemeClr val="accent1"/>
+                  </a:solidFill>
+                </a:ln>
+              </p:spPr>
+              <p:style>
+                <a:lnRef idx="1">
+                  <a:schemeClr val="dk1"/>
+                </a:lnRef>
+                <a:fillRef idx="0">
+                  <a:schemeClr val="dk1"/>
+                </a:fillRef>
+                <a:effectRef idx="0">
+                  <a:schemeClr val="dk1"/>
+                </a:effectRef>
+                <a:fontRef idx="minor">
+                  <a:schemeClr val="tx1"/>
+                </a:fontRef>
+              </p:style>
+            </p:cxnSp>
+            <p:cxnSp>
+              <p:nvCxnSpPr>
+                <p:cNvPr id="29" name="直接连接符 28">
+                  <a:extLst>
+                    <a:ext uri="{FF2B5EF4-FFF2-40B4-BE49-F238E27FC236}">
+                      <a16:creationId xmlns:a16="http://schemas.microsoft.com/office/drawing/2014/main" id="{1FCEFD33-4444-346D-29F2-213F550296D1}"/>
+                    </a:ext>
+                  </a:extLst>
+                </p:cNvPr>
+                <p:cNvCxnSpPr>
+                  <a:cxnSpLocks/>
+                </p:cNvCxnSpPr>
+                <p:nvPr/>
+              </p:nvCxnSpPr>
+              <p:spPr>
+                <a:xfrm flipV="1">
+                  <a:off x="7530716" y="1984375"/>
+                  <a:ext cx="0" cy="358775"/>
+                </a:xfrm>
+                <a:prstGeom prst="line">
+                  <a:avLst/>
+                </a:prstGeom>
+                <a:ln w="12700">
+                  <a:solidFill>
+                    <a:schemeClr val="tx1"/>
+                  </a:solidFill>
+                  <a:prstDash val="dash"/>
+                </a:ln>
+              </p:spPr>
+              <p:style>
+                <a:lnRef idx="1">
+                  <a:schemeClr val="dk1"/>
+                </a:lnRef>
+                <a:fillRef idx="0">
+                  <a:schemeClr val="dk1"/>
+                </a:fillRef>
+                <a:effectRef idx="0">
+                  <a:schemeClr val="dk1"/>
+                </a:effectRef>
+                <a:fontRef idx="minor">
+                  <a:schemeClr val="tx1"/>
+                </a:fontRef>
+              </p:style>
+            </p:cxnSp>
+            <p:sp>
+              <p:nvSpPr>
+                <p:cNvPr id="30" name="椭圆 29">
+                  <a:extLst>
+                    <a:ext uri="{FF2B5EF4-FFF2-40B4-BE49-F238E27FC236}">
+                      <a16:creationId xmlns:a16="http://schemas.microsoft.com/office/drawing/2014/main" id="{E600D5EB-5585-2A17-C33F-C30BDCF03F66}"/>
+                    </a:ext>
+                  </a:extLst>
+                </p:cNvPr>
+                <p:cNvSpPr/>
+                <p:nvPr/>
+              </p:nvSpPr>
+              <p:spPr>
+                <a:xfrm>
+                  <a:off x="6504251" y="3405018"/>
+                  <a:ext cx="45719" cy="45719"/>
+                </a:xfrm>
+                <a:prstGeom prst="ellipse">
+                  <a:avLst/>
+                </a:prstGeom>
+                <a:solidFill>
+                  <a:schemeClr val="tx1"/>
+                </a:solidFill>
+                <a:ln>
+                  <a:solidFill>
+                    <a:schemeClr val="tx1"/>
+                  </a:solidFill>
+                </a:ln>
+              </p:spPr>
+              <p:style>
+                <a:lnRef idx="2">
+                  <a:schemeClr val="accent1">
+                    <a:shade val="50000"/>
+                  </a:schemeClr>
+                </a:lnRef>
+                <a:fillRef idx="1">
+                  <a:schemeClr val="accent1"/>
+                </a:fillRef>
+                <a:effectRef idx="0">
+                  <a:schemeClr val="accent1"/>
+                </a:effectRef>
+                <a:fontRef idx="minor">
+                  <a:schemeClr val="lt1"/>
+                </a:fontRef>
+              </p:style>
+              <p:txBody>
+                <a:bodyPr rtlCol="0" anchor="ctr"/>
+                <a:lstStyle/>
+                <a:p>
+                  <a:pPr algn="ctr"/>
+                  <a:endParaRPr lang="zh-CN" altLang="en-US"/>
+                </a:p>
+              </p:txBody>
+            </p:sp>
+            <p:sp>
+              <p:nvSpPr>
+                <p:cNvPr id="35" name="椭圆 34">
+                  <a:extLst>
+                    <a:ext uri="{FF2B5EF4-FFF2-40B4-BE49-F238E27FC236}">
+                      <a16:creationId xmlns:a16="http://schemas.microsoft.com/office/drawing/2014/main" id="{8F944B44-0EFF-9A61-1F08-B0E64B062F82}"/>
+                    </a:ext>
+                  </a:extLst>
+                </p:cNvPr>
+                <p:cNvSpPr/>
+                <p:nvPr/>
+              </p:nvSpPr>
+              <p:spPr>
+                <a:xfrm>
+                  <a:off x="7507856" y="1970492"/>
+                  <a:ext cx="45719" cy="45719"/>
+                </a:xfrm>
+                <a:prstGeom prst="ellipse">
+                  <a:avLst/>
+                </a:prstGeom>
+                <a:solidFill>
+                  <a:schemeClr val="tx1"/>
+                </a:solidFill>
+                <a:ln>
+                  <a:solidFill>
+                    <a:schemeClr val="tx1"/>
+                  </a:solidFill>
+                </a:ln>
+              </p:spPr>
+              <p:style>
+                <a:lnRef idx="2">
+                  <a:schemeClr val="accent1">
+                    <a:shade val="50000"/>
+                  </a:schemeClr>
+                </a:lnRef>
+                <a:fillRef idx="1">
+                  <a:schemeClr val="accent1"/>
+                </a:fillRef>
+                <a:effectRef idx="0">
+                  <a:schemeClr val="accent1"/>
+                </a:effectRef>
+                <a:fontRef idx="minor">
+                  <a:schemeClr val="lt1"/>
+                </a:fontRef>
+              </p:style>
+              <p:txBody>
+                <a:bodyPr rtlCol="0" anchor="ctr"/>
+                <a:lstStyle/>
+                <a:p>
+                  <a:pPr algn="ctr"/>
+                  <a:endParaRPr lang="zh-CN" altLang="en-US"/>
+                </a:p>
+              </p:txBody>
+            </p:sp>
+            <p:sp>
+              <p:nvSpPr>
+                <p:cNvPr id="38" name="椭圆 37">
+                  <a:extLst>
+                    <a:ext uri="{FF2B5EF4-FFF2-40B4-BE49-F238E27FC236}">
+                      <a16:creationId xmlns:a16="http://schemas.microsoft.com/office/drawing/2014/main" id="{7882CB4F-3A2D-94B1-FE98-EB3FFFD96373}"/>
+                    </a:ext>
+                  </a:extLst>
+                </p:cNvPr>
+                <p:cNvSpPr/>
+                <p:nvPr/>
+              </p:nvSpPr>
+              <p:spPr>
+                <a:xfrm>
+                  <a:off x="6998314" y="3395124"/>
+                  <a:ext cx="58914" cy="58914"/>
+                </a:xfrm>
+                <a:prstGeom prst="ellipse">
+                  <a:avLst/>
+                </a:prstGeom>
+                <a:noFill/>
+                <a:ln>
+                  <a:solidFill>
+                    <a:schemeClr val="tx1"/>
+                  </a:solidFill>
+                </a:ln>
+              </p:spPr>
+              <p:style>
+                <a:lnRef idx="2">
+                  <a:schemeClr val="accent1">
+                    <a:shade val="50000"/>
+                  </a:schemeClr>
+                </a:lnRef>
+                <a:fillRef idx="1">
+                  <a:schemeClr val="accent1"/>
+                </a:fillRef>
+                <a:effectRef idx="0">
+                  <a:schemeClr val="accent1"/>
+                </a:effectRef>
+                <a:fontRef idx="minor">
+                  <a:schemeClr val="lt1"/>
+                </a:fontRef>
+              </p:style>
+              <p:txBody>
+                <a:bodyPr rtlCol="0" anchor="ctr"/>
+                <a:lstStyle/>
+                <a:p>
+                  <a:pPr algn="ctr"/>
+                  <a:endParaRPr lang="zh-CN" altLang="en-US"/>
+                </a:p>
+              </p:txBody>
+            </p:sp>
+            <p:sp>
+              <p:nvSpPr>
+                <p:cNvPr id="39" name="椭圆 38">
+                  <a:extLst>
+                    <a:ext uri="{FF2B5EF4-FFF2-40B4-BE49-F238E27FC236}">
+                      <a16:creationId xmlns:a16="http://schemas.microsoft.com/office/drawing/2014/main" id="{C19274D6-B8AA-056D-16E8-37C0DA2D67C0}"/>
+                    </a:ext>
+                  </a:extLst>
+                </p:cNvPr>
+                <p:cNvSpPr/>
+                <p:nvPr/>
+              </p:nvSpPr>
+              <p:spPr>
+                <a:xfrm>
+                  <a:off x="6498481" y="3827040"/>
+                  <a:ext cx="58920" cy="58920"/>
+                </a:xfrm>
+                <a:prstGeom prst="ellipse">
+                  <a:avLst/>
+                </a:prstGeom>
+                <a:noFill/>
+                <a:ln>
+                  <a:solidFill>
+                    <a:schemeClr val="tx1"/>
+                  </a:solidFill>
+                </a:ln>
+              </p:spPr>
+              <p:style>
+                <a:lnRef idx="2">
+                  <a:schemeClr val="accent1">
+                    <a:shade val="50000"/>
+                  </a:schemeClr>
+                </a:lnRef>
+                <a:fillRef idx="1">
+                  <a:schemeClr val="accent1"/>
+                </a:fillRef>
+                <a:effectRef idx="0">
+                  <a:schemeClr val="accent1"/>
+                </a:effectRef>
+                <a:fontRef idx="minor">
+                  <a:schemeClr val="lt1"/>
+                </a:fontRef>
+              </p:style>
+              <p:txBody>
+                <a:bodyPr rtlCol="0" anchor="ctr"/>
+                <a:lstStyle/>
+                <a:p>
+                  <a:pPr algn="ctr"/>
+                  <a:endParaRPr lang="zh-CN" altLang="en-US"/>
+                </a:p>
+              </p:txBody>
+            </p:sp>
+            <p:sp>
+              <p:nvSpPr>
+                <p:cNvPr id="41" name="椭圆 40">
+                  <a:extLst>
+                    <a:ext uri="{FF2B5EF4-FFF2-40B4-BE49-F238E27FC236}">
+                      <a16:creationId xmlns:a16="http://schemas.microsoft.com/office/drawing/2014/main" id="{67A4BC20-E99C-99AB-4A46-811B2E951468}"/>
+                    </a:ext>
+                  </a:extLst>
+                </p:cNvPr>
+                <p:cNvSpPr/>
+                <p:nvPr/>
+              </p:nvSpPr>
+              <p:spPr>
+                <a:xfrm>
+                  <a:off x="6073090" y="3837943"/>
+                  <a:ext cx="45719" cy="45719"/>
+                </a:xfrm>
+                <a:prstGeom prst="ellipse">
+                  <a:avLst/>
+                </a:prstGeom>
+                <a:solidFill>
+                  <a:schemeClr val="tx1"/>
+                </a:solidFill>
+                <a:ln>
+                  <a:solidFill>
+                    <a:schemeClr val="tx1"/>
+                  </a:solidFill>
+                </a:ln>
+              </p:spPr>
+              <p:style>
+                <a:lnRef idx="2">
+                  <a:schemeClr val="accent1">
+                    <a:shade val="50000"/>
+                  </a:schemeClr>
+                </a:lnRef>
+                <a:fillRef idx="1">
+                  <a:schemeClr val="accent1"/>
+                </a:fillRef>
+                <a:effectRef idx="0">
+                  <a:schemeClr val="accent1"/>
+                </a:effectRef>
+                <a:fontRef idx="minor">
+                  <a:schemeClr val="lt1"/>
+                </a:fontRef>
+              </p:style>
+              <p:txBody>
+                <a:bodyPr rtlCol="0" anchor="ctr"/>
+                <a:lstStyle/>
+                <a:p>
+                  <a:pPr algn="ctr"/>
+                  <a:endParaRPr lang="zh-CN" altLang="en-US"/>
+                </a:p>
+              </p:txBody>
+            </p:sp>
+            <p:grpSp>
+              <p:nvGrpSpPr>
+                <p:cNvPr id="82" name="组合 81">
+                  <a:extLst>
+                    <a:ext uri="{FF2B5EF4-FFF2-40B4-BE49-F238E27FC236}">
+                      <a16:creationId xmlns:a16="http://schemas.microsoft.com/office/drawing/2014/main" id="{C8D04373-034B-1240-B509-6F9EC62F17D8}"/>
+                    </a:ext>
+                  </a:extLst>
+                </p:cNvPr>
+                <p:cNvGrpSpPr/>
+                <p:nvPr/>
+              </p:nvGrpSpPr>
+              <p:grpSpPr>
+                <a:xfrm>
+                  <a:off x="6095949" y="2708921"/>
+                  <a:ext cx="931821" cy="1145530"/>
+                  <a:chOff x="6095949" y="2708920"/>
+                  <a:chExt cx="931821" cy="1151879"/>
+                </a:xfrm>
+              </p:grpSpPr>
+              <p:cxnSp>
+                <p:nvCxnSpPr>
+                  <p:cNvPr id="50" name="直接连接符 49">
+                    <a:extLst>
+                      <a:ext uri="{FF2B5EF4-FFF2-40B4-BE49-F238E27FC236}">
+                        <a16:creationId xmlns:a16="http://schemas.microsoft.com/office/drawing/2014/main" id="{E2FA39FB-A759-3644-1403-61DC5A4A5E93}"/>
+                      </a:ext>
+                    </a:extLst>
+                  </p:cNvPr>
+                  <p:cNvCxnSpPr>
+                    <a:cxnSpLocks/>
+                  </p:cNvCxnSpPr>
+                  <p:nvPr/>
+                </p:nvCxnSpPr>
+                <p:spPr>
+                  <a:xfrm flipH="1">
+                    <a:off x="6095949" y="2711426"/>
+                    <a:ext cx="931821" cy="0"/>
+                  </a:xfrm>
+                  <a:prstGeom prst="line">
+                    <a:avLst/>
+                  </a:prstGeom>
+                  <a:ln w="19050">
+                    <a:solidFill>
+                      <a:schemeClr val="accent1">
+                        <a:lumMod val="60000"/>
+                        <a:lumOff val="40000"/>
+                      </a:schemeClr>
+                    </a:solidFill>
+                    <a:prstDash val="solid"/>
+                    <a:headEnd type="oval" w="sm" len="sm"/>
+                    <a:tailEnd type="oval" w="sm" len="sm"/>
+                  </a:ln>
+                </p:spPr>
+                <p:style>
+                  <a:lnRef idx="1">
+                    <a:schemeClr val="dk1"/>
+                  </a:lnRef>
+                  <a:fillRef idx="0">
+                    <a:schemeClr val="dk1"/>
+                  </a:fillRef>
+                  <a:effectRef idx="0">
+                    <a:schemeClr val="dk1"/>
+                  </a:effectRef>
+                  <a:fontRef idx="minor">
+                    <a:schemeClr val="tx1"/>
+                  </a:fontRef>
+                </p:style>
+              </p:cxnSp>
+              <p:cxnSp>
+                <p:nvCxnSpPr>
+                  <p:cNvPr id="53" name="直接连接符 52">
+                    <a:extLst>
+                      <a:ext uri="{FF2B5EF4-FFF2-40B4-BE49-F238E27FC236}">
+                        <a16:creationId xmlns:a16="http://schemas.microsoft.com/office/drawing/2014/main" id="{C44EB146-E35A-5DC1-6786-0831C5843193}"/>
+                      </a:ext>
+                    </a:extLst>
+                  </p:cNvPr>
+                  <p:cNvCxnSpPr>
+                    <a:cxnSpLocks/>
+                  </p:cNvCxnSpPr>
+                  <p:nvPr/>
+                </p:nvCxnSpPr>
+                <p:spPr>
+                  <a:xfrm flipV="1">
+                    <a:off x="7027770" y="2708920"/>
+                    <a:ext cx="0" cy="1151879"/>
+                  </a:xfrm>
+                  <a:prstGeom prst="line">
+                    <a:avLst/>
+                  </a:prstGeom>
+                  <a:ln w="19050">
+                    <a:solidFill>
+                      <a:schemeClr val="accent1">
+                        <a:lumMod val="60000"/>
+                        <a:lumOff val="40000"/>
+                      </a:schemeClr>
+                    </a:solidFill>
+                    <a:prstDash val="solid"/>
+                    <a:headEnd type="triangle"/>
+                  </a:ln>
+                </p:spPr>
+                <p:style>
+                  <a:lnRef idx="1">
+                    <a:schemeClr val="dk1"/>
+                  </a:lnRef>
+                  <a:fillRef idx="0">
+                    <a:schemeClr val="dk1"/>
+                  </a:fillRef>
+                  <a:effectRef idx="0">
+                    <a:schemeClr val="dk1"/>
+                  </a:effectRef>
+                  <a:fontRef idx="minor">
+                    <a:schemeClr val="tx1"/>
+                  </a:fontRef>
+                </p:style>
+              </p:cxnSp>
+            </p:grpSp>
+            <p:grpSp>
+              <p:nvGrpSpPr>
+                <p:cNvPr id="80" name="组合 79">
+                  <a:extLst>
+                    <a:ext uri="{FF2B5EF4-FFF2-40B4-BE49-F238E27FC236}">
+                      <a16:creationId xmlns:a16="http://schemas.microsoft.com/office/drawing/2014/main" id="{B64291E8-0497-A1B3-A4AB-4E4DF96390D2}"/>
+                    </a:ext>
+                  </a:extLst>
+                </p:cNvPr>
+                <p:cNvGrpSpPr/>
+                <p:nvPr/>
+              </p:nvGrpSpPr>
+              <p:grpSpPr>
+                <a:xfrm>
+                  <a:off x="6097874" y="2345307"/>
+                  <a:ext cx="1432841" cy="1509144"/>
+                  <a:chOff x="6097874" y="2343348"/>
+                  <a:chExt cx="931821" cy="1151879"/>
+                </a:xfrm>
+              </p:grpSpPr>
+              <p:cxnSp>
+                <p:nvCxnSpPr>
+                  <p:cNvPr id="78" name="直接连接符 77">
+                    <a:extLst>
+                      <a:ext uri="{FF2B5EF4-FFF2-40B4-BE49-F238E27FC236}">
+                        <a16:creationId xmlns:a16="http://schemas.microsoft.com/office/drawing/2014/main" id="{16A468B5-FF41-5D71-FADE-C7527D719A90}"/>
+                      </a:ext>
+                    </a:extLst>
+                  </p:cNvPr>
+                  <p:cNvCxnSpPr>
+                    <a:cxnSpLocks/>
+                  </p:cNvCxnSpPr>
+                  <p:nvPr/>
+                </p:nvCxnSpPr>
+                <p:spPr>
+                  <a:xfrm flipH="1">
+                    <a:off x="6097874" y="2345854"/>
+                    <a:ext cx="931821" cy="0"/>
+                  </a:xfrm>
+                  <a:prstGeom prst="line">
+                    <a:avLst/>
+                  </a:prstGeom>
+                  <a:ln w="19050">
+                    <a:solidFill>
+                      <a:schemeClr val="accent6">
+                        <a:lumMod val="60000"/>
+                        <a:lumOff val="40000"/>
+                      </a:schemeClr>
+                    </a:solidFill>
+                    <a:prstDash val="solid"/>
+                    <a:headEnd type="oval" w="sm" len="sm"/>
+                    <a:tailEnd type="oval" w="sm" len="sm"/>
+                  </a:ln>
+                </p:spPr>
+                <p:style>
+                  <a:lnRef idx="1">
+                    <a:schemeClr val="dk1"/>
+                  </a:lnRef>
+                  <a:fillRef idx="0">
+                    <a:schemeClr val="dk1"/>
+                  </a:fillRef>
+                  <a:effectRef idx="0">
+                    <a:schemeClr val="dk1"/>
+                  </a:effectRef>
+                  <a:fontRef idx="minor">
+                    <a:schemeClr val="tx1"/>
+                  </a:fontRef>
+                </p:style>
+              </p:cxnSp>
+              <p:cxnSp>
+                <p:nvCxnSpPr>
+                  <p:cNvPr id="79" name="直接连接符 78">
+                    <a:extLst>
+                      <a:ext uri="{FF2B5EF4-FFF2-40B4-BE49-F238E27FC236}">
+                        <a16:creationId xmlns:a16="http://schemas.microsoft.com/office/drawing/2014/main" id="{D5035023-4942-8238-CFA0-DF15D7DF5B7A}"/>
+                      </a:ext>
+                    </a:extLst>
+                  </p:cNvPr>
+                  <p:cNvCxnSpPr>
+                    <a:cxnSpLocks/>
+                  </p:cNvCxnSpPr>
+                  <p:nvPr/>
+                </p:nvCxnSpPr>
+                <p:spPr>
+                  <a:xfrm flipV="1">
+                    <a:off x="7029695" y="2343348"/>
+                    <a:ext cx="0" cy="1151879"/>
+                  </a:xfrm>
+                  <a:prstGeom prst="line">
+                    <a:avLst/>
+                  </a:prstGeom>
+                  <a:ln w="19050">
+                    <a:solidFill>
+                      <a:schemeClr val="accent6">
+                        <a:lumMod val="60000"/>
+                        <a:lumOff val="40000"/>
+                      </a:schemeClr>
+                    </a:solidFill>
+                    <a:prstDash val="solid"/>
+                    <a:headEnd type="triangle"/>
+                  </a:ln>
+                </p:spPr>
+                <p:style>
+                  <a:lnRef idx="1">
+                    <a:schemeClr val="dk1"/>
+                  </a:lnRef>
+                  <a:fillRef idx="0">
+                    <a:schemeClr val="dk1"/>
+                  </a:fillRef>
+                  <a:effectRef idx="0">
+                    <a:schemeClr val="dk1"/>
+                  </a:effectRef>
+                  <a:fontRef idx="minor">
+                    <a:schemeClr val="tx1"/>
+                  </a:fontRef>
+                </p:style>
+              </p:cxnSp>
+            </p:grpSp>
+            <p:cxnSp>
+              <p:nvCxnSpPr>
+                <p:cNvPr id="26" name="直接连接符 25">
+                  <a:extLst>
+                    <a:ext uri="{FF2B5EF4-FFF2-40B4-BE49-F238E27FC236}">
+                      <a16:creationId xmlns:a16="http://schemas.microsoft.com/office/drawing/2014/main" id="{14878691-91FC-3B35-5625-26C74C2E071F}"/>
+                    </a:ext>
+                  </a:extLst>
+                </p:cNvPr>
+                <p:cNvCxnSpPr>
+                  <a:cxnSpLocks/>
+                </p:cNvCxnSpPr>
+                <p:nvPr/>
+              </p:nvCxnSpPr>
+              <p:spPr>
+                <a:xfrm>
+                  <a:off x="7019946" y="2348632"/>
+                  <a:ext cx="510771" cy="0"/>
+                </a:xfrm>
+                <a:prstGeom prst="line">
+                  <a:avLst/>
+                </a:prstGeom>
+                <a:ln w="19050">
+                  <a:solidFill>
+                    <a:schemeClr val="accent1"/>
+                  </a:solidFill>
+                </a:ln>
+              </p:spPr>
+              <p:style>
+                <a:lnRef idx="1">
+                  <a:schemeClr val="dk1"/>
+                </a:lnRef>
+                <a:fillRef idx="0">
+                  <a:schemeClr val="dk1"/>
+                </a:fillRef>
+                <a:effectRef idx="0">
+                  <a:schemeClr val="dk1"/>
+                </a:effectRef>
+                <a:fontRef idx="minor">
+                  <a:schemeClr val="tx1"/>
+                </a:fontRef>
+              </p:style>
+            </p:cxnSp>
+            <p:sp>
+              <p:nvSpPr>
+                <p:cNvPr id="40" name="椭圆 39">
+                  <a:extLst>
+                    <a:ext uri="{FF2B5EF4-FFF2-40B4-BE49-F238E27FC236}">
+                      <a16:creationId xmlns:a16="http://schemas.microsoft.com/office/drawing/2014/main" id="{9D0A98DA-2687-E3E8-5751-FDDF201BD5F8}"/>
+                    </a:ext>
+                  </a:extLst>
+                </p:cNvPr>
+                <p:cNvSpPr/>
+                <p:nvPr/>
+              </p:nvSpPr>
+              <p:spPr>
+                <a:xfrm>
+                  <a:off x="7501258" y="2316329"/>
+                  <a:ext cx="58916" cy="58916"/>
+                </a:xfrm>
+                <a:prstGeom prst="ellipse">
+                  <a:avLst/>
+                </a:prstGeom>
+                <a:noFill/>
+                <a:ln>
+                  <a:solidFill>
+                    <a:schemeClr val="tx1"/>
+                  </a:solidFill>
+                </a:ln>
+              </p:spPr>
+              <p:style>
+                <a:lnRef idx="2">
+                  <a:schemeClr val="accent1">
+                    <a:shade val="50000"/>
+                  </a:schemeClr>
+                </a:lnRef>
+                <a:fillRef idx="1">
+                  <a:schemeClr val="accent1"/>
+                </a:fillRef>
+                <a:effectRef idx="0">
+                  <a:schemeClr val="accent1"/>
+                </a:effectRef>
+                <a:fontRef idx="minor">
+                  <a:schemeClr val="lt1"/>
+                </a:fontRef>
+              </p:style>
+              <p:txBody>
+                <a:bodyPr rtlCol="0" anchor="ctr"/>
+                <a:lstStyle/>
+                <a:p>
+                  <a:pPr algn="ctr"/>
+                  <a:endParaRPr lang="zh-CN" altLang="en-US"/>
+                </a:p>
+              </p:txBody>
+            </p:sp>
+            <p:sp>
+              <p:nvSpPr>
+                <p:cNvPr id="33" name="椭圆 32">
+                  <a:extLst>
+                    <a:ext uri="{FF2B5EF4-FFF2-40B4-BE49-F238E27FC236}">
+                      <a16:creationId xmlns:a16="http://schemas.microsoft.com/office/drawing/2014/main" id="{CE5910ED-43FB-ED75-AB4E-DD8EE4EFEE4A}"/>
+                    </a:ext>
+                  </a:extLst>
+                </p:cNvPr>
+                <p:cNvSpPr/>
+                <p:nvPr/>
+              </p:nvSpPr>
+              <p:spPr>
+                <a:xfrm>
+                  <a:off x="7004911" y="2324897"/>
+                  <a:ext cx="45719" cy="45719"/>
+                </a:xfrm>
+                <a:prstGeom prst="ellipse">
+                  <a:avLst/>
+                </a:prstGeom>
+                <a:solidFill>
+                  <a:schemeClr val="tx1"/>
+                </a:solidFill>
+                <a:ln>
+                  <a:solidFill>
+                    <a:schemeClr val="tx1"/>
+                  </a:solidFill>
+                </a:ln>
+              </p:spPr>
+              <p:style>
+                <a:lnRef idx="2">
+                  <a:schemeClr val="accent1">
+                    <a:shade val="50000"/>
+                  </a:schemeClr>
+                </a:lnRef>
+                <a:fillRef idx="1">
+                  <a:schemeClr val="accent1"/>
+                </a:fillRef>
+                <a:effectRef idx="0">
+                  <a:schemeClr val="accent1"/>
+                </a:effectRef>
+                <a:fontRef idx="minor">
+                  <a:schemeClr val="lt1"/>
+                </a:fontRef>
+              </p:style>
+              <p:txBody>
+                <a:bodyPr rtlCol="0" anchor="ctr"/>
+                <a:lstStyle/>
+                <a:p>
+                  <a:pPr algn="ctr"/>
+                  <a:endParaRPr lang="zh-CN" altLang="en-US"/>
+                </a:p>
+              </p:txBody>
+            </p:sp>
+            <p:graphicFrame>
+              <p:nvGraphicFramePr>
+                <p:cNvPr id="85" name="对象 84">
+                  <a:extLst>
+                    <a:ext uri="{FF2B5EF4-FFF2-40B4-BE49-F238E27FC236}">
+                      <a16:creationId xmlns:a16="http://schemas.microsoft.com/office/drawing/2014/main" id="{CFC3D312-D7EC-3F21-562A-CB2C7F512081}"/>
+                    </a:ext>
+                  </a:extLst>
+                </p:cNvPr>
+                <p:cNvGraphicFramePr>
+                  <a:graphicFrameLocks noChangeAspect="1"/>
+                </p:cNvGraphicFramePr>
+                <p:nvPr>
+                  <p:extLst>
+                    <p:ext uri="{D42A27DB-BD31-4B8C-83A1-F6EECF244321}">
+                      <p14:modId xmlns:p14="http://schemas.microsoft.com/office/powerpoint/2010/main" val="2360593609"/>
+                    </p:ext>
+                  </p:extLst>
+                </p:nvPr>
+              </p:nvGraphicFramePr>
+              <p:xfrm>
+                <a:off x="6436089" y="3861048"/>
+                <a:ext cx="176213" cy="265112"/>
+              </p:xfrm>
+              <a:graphic>
+                <a:graphicData uri="http://schemas.openxmlformats.org/presentationml/2006/ole">
+                  <mc:AlternateContent xmlns:mc="http://schemas.openxmlformats.org/markup-compatibility/2006">
+                    <mc:Choice xmlns:v="urn:schemas-microsoft-com:vml" Requires="v">
+                      <p:oleObj name="AxMath" r:id="rId8" imgW="124920" imgH="189720" progId="Equation.AxMath">
+                        <p:embed/>
+                      </p:oleObj>
+                    </mc:Choice>
+                    <mc:Fallback>
+                      <p:oleObj name="AxMath" r:id="rId8" imgW="124920" imgH="189720" progId="Equation.AxMath">
+                        <p:embed/>
+                        <p:pic>
+                          <p:nvPicPr>
+                            <p:cNvPr id="10" name="对象 9">
+                              <a:extLst>
+                                <a:ext uri="{FF2B5EF4-FFF2-40B4-BE49-F238E27FC236}">
+                                  <a16:creationId xmlns:a16="http://schemas.microsoft.com/office/drawing/2014/main" id="{9A3A4EA4-4FF7-08AB-69B5-60B02F290DC0}"/>
+                                </a:ext>
+                              </a:extLst>
+                            </p:cNvPr>
+                            <p:cNvPicPr/>
+                            <p:nvPr/>
+                          </p:nvPicPr>
+                          <p:blipFill>
+                            <a:blip r:embed="rId9"/>
+                            <a:stretch>
+                              <a:fillRect/>
+                            </a:stretch>
+                          </p:blipFill>
+                          <p:spPr>
+                            <a:xfrm>
+                              <a:off x="6436089" y="3861048"/>
+                              <a:ext cx="176213" cy="265112"/>
+                            </a:xfrm>
+                            <a:prstGeom prst="rect">
+                              <a:avLst/>
+                            </a:prstGeom>
+                          </p:spPr>
+                        </p:pic>
+                      </p:oleObj>
+                    </mc:Fallback>
+                  </mc:AlternateContent>
+                </a:graphicData>
+              </a:graphic>
+            </p:graphicFrame>
+            <p:graphicFrame>
+              <p:nvGraphicFramePr>
+                <p:cNvPr id="86" name="对象 85">
+                  <a:extLst>
+                    <a:ext uri="{FF2B5EF4-FFF2-40B4-BE49-F238E27FC236}">
+                      <a16:creationId xmlns:a16="http://schemas.microsoft.com/office/drawing/2014/main" id="{E64AF96C-08A4-7A9B-BBF7-53490548A712}"/>
+                    </a:ext>
+                  </a:extLst>
+                </p:cNvPr>
+                <p:cNvGraphicFramePr>
+                  <a:graphicFrameLocks noChangeAspect="1"/>
+                </p:cNvGraphicFramePr>
+                <p:nvPr>
+                  <p:extLst>
+                    <p:ext uri="{D42A27DB-BD31-4B8C-83A1-F6EECF244321}">
+                      <p14:modId xmlns:p14="http://schemas.microsoft.com/office/powerpoint/2010/main" val="646526459"/>
+                    </p:ext>
+                  </p:extLst>
+                </p:nvPr>
+              </p:nvGraphicFramePr>
+              <p:xfrm>
+                <a:off x="8659370" y="3722142"/>
+                <a:ext cx="144462" cy="271462"/>
+              </p:xfrm>
+              <a:graphic>
+                <a:graphicData uri="http://schemas.openxmlformats.org/presentationml/2006/ole">
+                  <mc:AlternateContent xmlns:mc="http://schemas.openxmlformats.org/markup-compatibility/2006">
+                    <mc:Choice xmlns:v="urn:schemas-microsoft-com:vml" Requires="v">
+                      <p:oleObj name="AxMath" r:id="rId10" imgW="99720" imgH="188280" progId="Equation.AxMath">
+                        <p:embed/>
+                      </p:oleObj>
+                    </mc:Choice>
+                    <mc:Fallback>
+                      <p:oleObj name="AxMath" r:id="rId10" imgW="99720" imgH="188280" progId="Equation.AxMath">
+                        <p:embed/>
+                        <p:pic>
+                          <p:nvPicPr>
+                            <p:cNvPr id="11" name="对象 10">
+                              <a:extLst>
+                                <a:ext uri="{FF2B5EF4-FFF2-40B4-BE49-F238E27FC236}">
+                                  <a16:creationId xmlns:a16="http://schemas.microsoft.com/office/drawing/2014/main" id="{C038B34A-A9AF-4CEE-2DC9-9C9FB142EFAC}"/>
+                                </a:ext>
+                              </a:extLst>
+                            </p:cNvPr>
+                            <p:cNvPicPr/>
+                            <p:nvPr/>
+                          </p:nvPicPr>
+                          <p:blipFill>
+                            <a:blip r:embed="rId11"/>
+                            <a:stretch>
+                              <a:fillRect/>
+                            </a:stretch>
+                          </p:blipFill>
+                          <p:spPr>
+                            <a:xfrm>
+                              <a:off x="8659370" y="3722142"/>
+                              <a:ext cx="144462" cy="271462"/>
+                            </a:xfrm>
+                            <a:prstGeom prst="rect">
+                              <a:avLst/>
+                            </a:prstGeom>
+                          </p:spPr>
+                        </p:pic>
+                      </p:oleObj>
+                    </mc:Fallback>
+                  </mc:AlternateContent>
+                </a:graphicData>
+              </a:graphic>
+            </p:graphicFrame>
+            <p:graphicFrame>
+              <p:nvGraphicFramePr>
+                <p:cNvPr id="87" name="对象 86">
+                  <a:extLst>
+                    <a:ext uri="{FF2B5EF4-FFF2-40B4-BE49-F238E27FC236}">
+                      <a16:creationId xmlns:a16="http://schemas.microsoft.com/office/drawing/2014/main" id="{5C4FACDE-6632-32EB-2385-4CFBE395BE5F}"/>
+                    </a:ext>
+                  </a:extLst>
+                </p:cNvPr>
+                <p:cNvGraphicFramePr>
+                  <a:graphicFrameLocks noChangeAspect="1"/>
+                </p:cNvGraphicFramePr>
+                <p:nvPr>
+                  <p:extLst>
+                    <p:ext uri="{D42A27DB-BD31-4B8C-83A1-F6EECF244321}">
+                      <p14:modId xmlns:p14="http://schemas.microsoft.com/office/powerpoint/2010/main" val="1314149751"/>
+                    </p:ext>
+                  </p:extLst>
+                </p:nvPr>
+              </p:nvGraphicFramePr>
+              <p:xfrm>
+                <a:off x="5879976" y="2565834"/>
+                <a:ext cx="174625" cy="274638"/>
+              </p:xfrm>
+              <a:graphic>
+                <a:graphicData uri="http://schemas.openxmlformats.org/presentationml/2006/ole">
+                  <mc:AlternateContent xmlns:mc="http://schemas.openxmlformats.org/markup-compatibility/2006">
+                    <mc:Choice xmlns:v="urn:schemas-microsoft-com:vml" Requires="v">
+                      <p:oleObj name="AxMath" r:id="rId12" imgW="120600" imgH="189720" progId="Equation.AxMath">
+                        <p:embed/>
+                      </p:oleObj>
+                    </mc:Choice>
+                    <mc:Fallback>
+                      <p:oleObj name="AxMath" r:id="rId12" imgW="120600" imgH="189720" progId="Equation.AxMath">
+                        <p:embed/>
+                        <p:pic>
+                          <p:nvPicPr>
+                            <p:cNvPr id="11" name="对象 10">
+                              <a:extLst>
+                                <a:ext uri="{FF2B5EF4-FFF2-40B4-BE49-F238E27FC236}">
+                                  <a16:creationId xmlns:a16="http://schemas.microsoft.com/office/drawing/2014/main" id="{C038B34A-A9AF-4CEE-2DC9-9C9FB142EFAC}"/>
+                                </a:ext>
+                              </a:extLst>
+                            </p:cNvPr>
+                            <p:cNvPicPr/>
+                            <p:nvPr/>
+                          </p:nvPicPr>
+                          <p:blipFill>
+                            <a:blip r:embed="rId13"/>
+                            <a:stretch>
+                              <a:fillRect/>
+                            </a:stretch>
+                          </p:blipFill>
+                          <p:spPr>
+                            <a:xfrm>
+                              <a:off x="5879976" y="2565834"/>
+                              <a:ext cx="174625" cy="274638"/>
+                            </a:xfrm>
+                            <a:prstGeom prst="rect">
+                              <a:avLst/>
+                            </a:prstGeom>
+                          </p:spPr>
+                        </p:pic>
+                      </p:oleObj>
+                    </mc:Fallback>
+                  </mc:AlternateContent>
+                </a:graphicData>
+              </a:graphic>
+            </p:graphicFrame>
+            <p:graphicFrame>
+              <p:nvGraphicFramePr>
+                <p:cNvPr id="88" name="对象 87">
+                  <a:extLst>
+                    <a:ext uri="{FF2B5EF4-FFF2-40B4-BE49-F238E27FC236}">
+                      <a16:creationId xmlns:a16="http://schemas.microsoft.com/office/drawing/2014/main" id="{8F032FB1-E859-50BF-DB71-C9E20C78CAC4}"/>
+                    </a:ext>
+                  </a:extLst>
+                </p:cNvPr>
+                <p:cNvGraphicFramePr>
+                  <a:graphicFrameLocks noChangeAspect="1"/>
+                </p:cNvGraphicFramePr>
+                <p:nvPr>
+                  <p:extLst>
+                    <p:ext uri="{D42A27DB-BD31-4B8C-83A1-F6EECF244321}">
+                      <p14:modId xmlns:p14="http://schemas.microsoft.com/office/powerpoint/2010/main" val="3855670393"/>
+                    </p:ext>
+                  </p:extLst>
+                </p:nvPr>
+              </p:nvGraphicFramePr>
+              <p:xfrm>
+                <a:off x="5447928" y="2206625"/>
+                <a:ext cx="196850" cy="274638"/>
+              </p:xfrm>
+              <a:graphic>
+                <a:graphicData uri="http://schemas.openxmlformats.org/presentationml/2006/ole">
+                  <mc:AlternateContent xmlns:mc="http://schemas.openxmlformats.org/markup-compatibility/2006">
+                    <mc:Choice xmlns:v="urn:schemas-microsoft-com:vml" Requires="v">
+                      <p:oleObj name="AxMath" r:id="rId14" imgW="135000" imgH="189720" progId="Equation.AxMath">
+                        <p:embed/>
+                      </p:oleObj>
+                    </mc:Choice>
+                    <mc:Fallback>
+                      <p:oleObj name="AxMath" r:id="rId14" imgW="135000" imgH="189720" progId="Equation.AxMath">
+                        <p:embed/>
+                        <p:pic>
+                          <p:nvPicPr>
+                            <p:cNvPr id="87" name="对象 86">
+                              <a:extLst>
+                                <a:ext uri="{FF2B5EF4-FFF2-40B4-BE49-F238E27FC236}">
+                                  <a16:creationId xmlns:a16="http://schemas.microsoft.com/office/drawing/2014/main" id="{5C4FACDE-6632-32EB-2385-4CFBE395BE5F}"/>
+                                </a:ext>
+                              </a:extLst>
+                            </p:cNvPr>
+                            <p:cNvPicPr/>
+                            <p:nvPr/>
+                          </p:nvPicPr>
+                          <p:blipFill>
+                            <a:blip r:embed="rId15"/>
+                            <a:stretch>
+                              <a:fillRect/>
+                            </a:stretch>
+                          </p:blipFill>
+                          <p:spPr>
+                            <a:xfrm>
+                              <a:off x="5447928" y="2206625"/>
+                              <a:ext cx="196850" cy="274638"/>
+                            </a:xfrm>
+                            <a:prstGeom prst="rect">
+                              <a:avLst/>
+                            </a:prstGeom>
+                          </p:spPr>
+                        </p:pic>
+                      </p:oleObj>
+                    </mc:Fallback>
+                  </mc:AlternateContent>
+                </a:graphicData>
+              </a:graphic>
+            </p:graphicFrame>
+          </p:grpSp>
+          <p:grpSp>
+            <p:nvGrpSpPr>
+              <p:cNvPr id="105" name="组合 104">
+                <a:extLst>
+                  <a:ext uri="{FF2B5EF4-FFF2-40B4-BE49-F238E27FC236}">
+                    <a16:creationId xmlns:a16="http://schemas.microsoft.com/office/drawing/2014/main" id="{9E0594DC-3C33-873C-79EF-FF6AA597B609}"/>
+                  </a:ext>
+                </a:extLst>
+              </p:cNvPr>
+              <p:cNvGrpSpPr/>
+              <p:nvPr/>
+            </p:nvGrpSpPr>
+            <p:grpSpPr>
+              <a:xfrm>
+                <a:off x="1362536" y="1404578"/>
+                <a:ext cx="3112078" cy="2765958"/>
+                <a:chOff x="1362536" y="1404578"/>
+                <a:chExt cx="3112078" cy="2765958"/>
+              </a:xfrm>
+            </p:grpSpPr>
+            <p:cxnSp>
+              <p:nvCxnSpPr>
+                <p:cNvPr id="5" name="直接箭头连接符 4">
+                  <a:extLst>
+                    <a:ext uri="{FF2B5EF4-FFF2-40B4-BE49-F238E27FC236}">
+                      <a16:creationId xmlns:a16="http://schemas.microsoft.com/office/drawing/2014/main" id="{4A3EF913-0214-A937-09A4-3FBA101FBA6D}"/>
+                    </a:ext>
+                  </a:extLst>
+                </p:cNvPr>
+                <p:cNvCxnSpPr>
+                  <a:cxnSpLocks/>
+                </p:cNvCxnSpPr>
+                <p:nvPr/>
+              </p:nvCxnSpPr>
+              <p:spPr>
+                <a:xfrm flipV="1">
+                  <a:off x="1774072" y="1628552"/>
+                  <a:ext cx="0" cy="2541984"/>
+                </a:xfrm>
+                <a:prstGeom prst="straightConnector1">
+                  <a:avLst/>
+                </a:prstGeom>
+                <a:ln w="12700">
+                  <a:tailEnd type="triangle"/>
+                </a:ln>
+              </p:spPr>
+              <p:style>
+                <a:lnRef idx="1">
+                  <a:schemeClr val="dk1"/>
+                </a:lnRef>
+                <a:fillRef idx="0">
+                  <a:schemeClr val="dk1"/>
+                </a:fillRef>
+                <a:effectRef idx="0">
+                  <a:schemeClr val="dk1"/>
+                </a:effectRef>
+                <a:fontRef idx="minor">
+                  <a:schemeClr val="tx1"/>
+                </a:fontRef>
+              </p:style>
+            </p:cxnSp>
+            <p:cxnSp>
+              <p:nvCxnSpPr>
+                <p:cNvPr id="8" name="直接箭头连接符 7">
+                  <a:extLst>
+                    <a:ext uri="{FF2B5EF4-FFF2-40B4-BE49-F238E27FC236}">
+                      <a16:creationId xmlns:a16="http://schemas.microsoft.com/office/drawing/2014/main" id="{C2B6D58E-39E4-6B4A-984A-5AB272AC5E7E}"/>
+                    </a:ext>
+                  </a:extLst>
+                </p:cNvPr>
+                <p:cNvCxnSpPr>
+                  <a:cxnSpLocks/>
+                </p:cNvCxnSpPr>
+                <p:nvPr/>
+              </p:nvCxnSpPr>
+              <p:spPr>
+                <a:xfrm>
+                  <a:off x="1486040" y="3860800"/>
+                  <a:ext cx="2808312" cy="0"/>
+                </a:xfrm>
+                <a:prstGeom prst="straightConnector1">
+                  <a:avLst/>
+                </a:prstGeom>
+                <a:ln w="12700">
+                  <a:tailEnd type="triangle"/>
+                </a:ln>
+              </p:spPr>
+              <p:style>
+                <a:lnRef idx="1">
+                  <a:schemeClr val="dk1"/>
+                </a:lnRef>
+                <a:fillRef idx="0">
+                  <a:schemeClr val="dk1"/>
+                </a:fillRef>
+                <a:effectRef idx="0">
+                  <a:schemeClr val="dk1"/>
+                </a:effectRef>
+                <a:fontRef idx="minor">
+                  <a:schemeClr val="tx1"/>
+                </a:fontRef>
+              </p:style>
+            </p:cxnSp>
+            <p:cxnSp>
+              <p:nvCxnSpPr>
+                <p:cNvPr id="12" name="直接连接符 11">
+                  <a:extLst>
+                    <a:ext uri="{FF2B5EF4-FFF2-40B4-BE49-F238E27FC236}">
+                      <a16:creationId xmlns:a16="http://schemas.microsoft.com/office/drawing/2014/main" id="{05128E8A-FB9E-A530-B717-72B53EA5F570}"/>
+                    </a:ext>
+                  </a:extLst>
+                </p:cNvPr>
+                <p:cNvCxnSpPr>
+                  <a:cxnSpLocks/>
+                </p:cNvCxnSpPr>
+                <p:nvPr/>
+              </p:nvCxnSpPr>
+              <p:spPr>
+                <a:xfrm>
+                  <a:off x="1774072" y="3860800"/>
+                  <a:ext cx="432048" cy="0"/>
+                </a:xfrm>
+                <a:prstGeom prst="line">
+                  <a:avLst/>
+                </a:prstGeom>
+                <a:ln w="19050">
+                  <a:solidFill>
+                    <a:schemeClr val="accent1"/>
+                  </a:solidFill>
+                </a:ln>
+              </p:spPr>
+              <p:style>
+                <a:lnRef idx="1">
+                  <a:schemeClr val="dk1"/>
+                </a:lnRef>
+                <a:fillRef idx="0">
+                  <a:schemeClr val="dk1"/>
+                </a:fillRef>
+                <a:effectRef idx="0">
+                  <a:schemeClr val="dk1"/>
+                </a:effectRef>
+                <a:fontRef idx="minor">
+                  <a:schemeClr val="tx1"/>
+                </a:fontRef>
+              </p:style>
+            </p:cxnSp>
+            <p:cxnSp>
+              <p:nvCxnSpPr>
+                <p:cNvPr id="16" name="直接连接符 15">
+                  <a:extLst>
+                    <a:ext uri="{FF2B5EF4-FFF2-40B4-BE49-F238E27FC236}">
+                      <a16:creationId xmlns:a16="http://schemas.microsoft.com/office/drawing/2014/main" id="{C8124E5E-7DB0-2AEF-3072-C08892E96128}"/>
+                    </a:ext>
+                  </a:extLst>
+                </p:cNvPr>
+                <p:cNvCxnSpPr>
+                  <a:cxnSpLocks/>
+                </p:cNvCxnSpPr>
+                <p:nvPr/>
+              </p:nvCxnSpPr>
+              <p:spPr>
+                <a:xfrm>
+                  <a:off x="2206689" y="3428752"/>
+                  <a:ext cx="495498" cy="0"/>
+                </a:xfrm>
+                <a:prstGeom prst="line">
+                  <a:avLst/>
+                </a:prstGeom>
+                <a:ln w="19050">
+                  <a:solidFill>
+                    <a:schemeClr val="accent1"/>
+                  </a:solidFill>
+                </a:ln>
+              </p:spPr>
+              <p:style>
+                <a:lnRef idx="1">
+                  <a:schemeClr val="dk1"/>
+                </a:lnRef>
+                <a:fillRef idx="0">
+                  <a:schemeClr val="dk1"/>
+                </a:fillRef>
+                <a:effectRef idx="0">
+                  <a:schemeClr val="dk1"/>
+                </a:effectRef>
+                <a:fontRef idx="minor">
+                  <a:schemeClr val="tx1"/>
+                </a:fontRef>
+              </p:style>
+            </p:cxnSp>
+            <p:graphicFrame>
+              <p:nvGraphicFramePr>
+                <p:cNvPr id="37" name="对象 36">
+                  <a:extLst>
+                    <a:ext uri="{FF2B5EF4-FFF2-40B4-BE49-F238E27FC236}">
+                      <a16:creationId xmlns:a16="http://schemas.microsoft.com/office/drawing/2014/main" id="{2EBA2B6F-2EB2-4D02-48F2-80605E5DC11E}"/>
+                    </a:ext>
+                  </a:extLst>
+                </p:cNvPr>
+                <p:cNvGraphicFramePr>
+                  <a:graphicFrameLocks noChangeAspect="1"/>
+                </p:cNvGraphicFramePr>
+                <p:nvPr>
+                  <p:extLst>
+                    <p:ext uri="{D42A27DB-BD31-4B8C-83A1-F6EECF244321}">
+                      <p14:modId xmlns:p14="http://schemas.microsoft.com/office/powerpoint/2010/main" val="3360492767"/>
+                    </p:ext>
+                  </p:extLst>
+                </p:nvPr>
+              </p:nvGraphicFramePr>
+              <p:xfrm>
+                <a:off x="1558048" y="1404578"/>
+                <a:ext cx="444160" cy="226730"/>
+              </p:xfrm>
+              <a:graphic>
+                <a:graphicData uri="http://schemas.openxmlformats.org/presentationml/2006/ole">
+                  <mc:AlternateContent xmlns:mc="http://schemas.openxmlformats.org/markup-compatibility/2006">
+                    <mc:Choice xmlns:v="urn:schemas-microsoft-com:vml" Requires="v">
+                      <p:oleObj name="AxMath" r:id="rId6" imgW="375120" imgH="189720" progId="Equation.AxMath">
+                        <p:embed/>
+                      </p:oleObj>
+                    </mc:Choice>
+                    <mc:Fallback>
+                      <p:oleObj name="AxMath" r:id="rId6" imgW="375120" imgH="189720" progId="Equation.AxMath">
+                        <p:embed/>
+                        <p:pic>
+                          <p:nvPicPr>
+                            <p:cNvPr id="36" name="对象 35">
+                              <a:extLst>
+                                <a:ext uri="{FF2B5EF4-FFF2-40B4-BE49-F238E27FC236}">
+                                  <a16:creationId xmlns:a16="http://schemas.microsoft.com/office/drawing/2014/main" id="{8B2EFFB7-C0A0-4470-5725-D6F6B14EA0C8}"/>
+                                </a:ext>
+                              </a:extLst>
+                            </p:cNvPr>
+                            <p:cNvPicPr/>
+                            <p:nvPr/>
+                          </p:nvPicPr>
+                          <p:blipFill>
+                            <a:blip r:embed="rId7"/>
+                            <a:stretch>
+                              <a:fillRect/>
+                            </a:stretch>
+                          </p:blipFill>
+                          <p:spPr>
+                            <a:xfrm>
+                              <a:off x="1558048" y="1404578"/>
+                              <a:ext cx="444160" cy="226730"/>
+                            </a:xfrm>
+                            <a:prstGeom prst="rect">
+                              <a:avLst/>
+                            </a:prstGeom>
+                          </p:spPr>
+                        </p:pic>
+                      </p:oleObj>
+                    </mc:Fallback>
+                  </mc:AlternateContent>
+                </a:graphicData>
+              </a:graphic>
+            </p:graphicFrame>
+            <p:sp>
+              <p:nvSpPr>
+                <p:cNvPr id="45" name="文本框 44">
+                  <a:extLst>
+                    <a:ext uri="{FF2B5EF4-FFF2-40B4-BE49-F238E27FC236}">
+                      <a16:creationId xmlns:a16="http://schemas.microsoft.com/office/drawing/2014/main" id="{85A3B6AB-36F7-DF79-A779-5A5DD8E83C89}"/>
+                    </a:ext>
+                  </a:extLst>
+                </p:cNvPr>
+                <p:cNvSpPr txBox="1"/>
+                <p:nvPr/>
+              </p:nvSpPr>
+              <p:spPr>
+                <a:xfrm>
+                  <a:off x="1367795" y="3289380"/>
+                  <a:ext cx="453970" cy="276999"/>
+                </a:xfrm>
+                <a:prstGeom prst="rect">
+                  <a:avLst/>
+                </a:prstGeom>
+                <a:noFill/>
+              </p:spPr>
+              <p:txBody>
+                <a:bodyPr wrap="none" rtlCol="0">
+                  <a:spAutoFit/>
+                </a:bodyPr>
+                <a:lstStyle/>
+                <a:p>
+                  <a:r>
+                    <a:rPr lang="en-US" altLang="zh-CN" sz="1200" dirty="0">
+                      <a:latin typeface="Times New Roman" panose="02020603050405020304" pitchFamily="18" charset="0"/>
+                      <a:ea typeface="阿里巴巴普惠体 Medium" panose="00020600040101010101" pitchFamily="18" charset="-122"/>
+                      <a:cs typeface="Times New Roman" panose="02020603050405020304" pitchFamily="18" charset="0"/>
+                    </a:rPr>
+                    <a:t>0.25</a:t>
+                  </a:r>
+                  <a:endParaRPr lang="zh-CN" altLang="en-US" sz="1200" dirty="0">
+                    <a:latin typeface="Times New Roman" panose="02020603050405020304" pitchFamily="18" charset="0"/>
+                    <a:ea typeface="阿里巴巴普惠体 Medium" panose="00020600040101010101" pitchFamily="18" charset="-122"/>
+                    <a:cs typeface="Times New Roman" panose="02020603050405020304" pitchFamily="18" charset="0"/>
+                  </a:endParaRPr>
+                </a:p>
+              </p:txBody>
+            </p:sp>
+            <p:sp>
+              <p:nvSpPr>
+                <p:cNvPr id="46" name="文本框 45">
+                  <a:extLst>
+                    <a:ext uri="{FF2B5EF4-FFF2-40B4-BE49-F238E27FC236}">
+                      <a16:creationId xmlns:a16="http://schemas.microsoft.com/office/drawing/2014/main" id="{099DC7AB-08DD-0738-7AC0-ED165E706CC9}"/>
+                    </a:ext>
+                  </a:extLst>
+                </p:cNvPr>
+                <p:cNvSpPr txBox="1"/>
+                <p:nvPr/>
+              </p:nvSpPr>
+              <p:spPr>
+                <a:xfrm>
+                  <a:off x="1559136" y="3827040"/>
+                  <a:ext cx="261610" cy="276999"/>
+                </a:xfrm>
+                <a:prstGeom prst="rect">
+                  <a:avLst/>
+                </a:prstGeom>
+                <a:noFill/>
+              </p:spPr>
+              <p:txBody>
+                <a:bodyPr wrap="none" rtlCol="0">
+                  <a:spAutoFit/>
+                </a:bodyPr>
+                <a:lstStyle/>
+                <a:p>
+                  <a:r>
+                    <a:rPr lang="en-US" altLang="zh-CN" sz="1200" dirty="0">
+                      <a:latin typeface="Times New Roman" panose="02020603050405020304" pitchFamily="18" charset="0"/>
+                      <a:ea typeface="阿里巴巴普惠体 Medium" panose="00020600040101010101" pitchFamily="18" charset="-122"/>
+                      <a:cs typeface="Times New Roman" panose="02020603050405020304" pitchFamily="18" charset="0"/>
+                    </a:rPr>
+                    <a:t>0</a:t>
+                  </a:r>
+                  <a:endParaRPr lang="zh-CN" altLang="en-US" sz="1200" dirty="0">
+                    <a:latin typeface="Times New Roman" panose="02020603050405020304" pitchFamily="18" charset="0"/>
+                    <a:ea typeface="阿里巴巴普惠体 Medium" panose="00020600040101010101" pitchFamily="18" charset="-122"/>
+                    <a:cs typeface="Times New Roman" panose="02020603050405020304" pitchFamily="18" charset="0"/>
+                  </a:endParaRPr>
+                </a:p>
+              </p:txBody>
+            </p:sp>
+            <p:sp>
+              <p:nvSpPr>
+                <p:cNvPr id="47" name="文本框 46">
+                  <a:extLst>
+                    <a:ext uri="{FF2B5EF4-FFF2-40B4-BE49-F238E27FC236}">
+                      <a16:creationId xmlns:a16="http://schemas.microsoft.com/office/drawing/2014/main" id="{5438E959-26EB-8DD2-8CC4-2509B72F1D77}"/>
+                    </a:ext>
+                  </a:extLst>
+                </p:cNvPr>
+                <p:cNvSpPr txBox="1"/>
+                <p:nvPr/>
+              </p:nvSpPr>
+              <p:spPr>
+                <a:xfrm>
+                  <a:off x="1362536" y="2210131"/>
+                  <a:ext cx="453970" cy="276999"/>
+                </a:xfrm>
+                <a:prstGeom prst="rect">
+                  <a:avLst/>
+                </a:prstGeom>
+                <a:noFill/>
+              </p:spPr>
+              <p:txBody>
+                <a:bodyPr wrap="none" rtlCol="0">
+                  <a:spAutoFit/>
+                </a:bodyPr>
+                <a:lstStyle/>
+                <a:p>
+                  <a:r>
+                    <a:rPr lang="en-US" altLang="zh-CN" sz="1200" dirty="0">
+                      <a:latin typeface="Times New Roman" panose="02020603050405020304" pitchFamily="18" charset="0"/>
+                      <a:ea typeface="阿里巴巴普惠体 Medium" panose="00020600040101010101" pitchFamily="18" charset="-122"/>
+                      <a:cs typeface="Times New Roman" panose="02020603050405020304" pitchFamily="18" charset="0"/>
+                    </a:rPr>
+                    <a:t>0.85</a:t>
+                  </a:r>
+                  <a:endParaRPr lang="zh-CN" altLang="en-US" sz="1200" dirty="0">
+                    <a:latin typeface="Times New Roman" panose="02020603050405020304" pitchFamily="18" charset="0"/>
+                    <a:ea typeface="阿里巴巴普惠体 Medium" panose="00020600040101010101" pitchFamily="18" charset="-122"/>
+                    <a:cs typeface="Times New Roman" panose="02020603050405020304" pitchFamily="18" charset="0"/>
+                  </a:endParaRPr>
+                </a:p>
+              </p:txBody>
+            </p:sp>
+            <p:sp>
+              <p:nvSpPr>
+                <p:cNvPr id="49" name="文本框 48">
+                  <a:extLst>
+                    <a:ext uri="{FF2B5EF4-FFF2-40B4-BE49-F238E27FC236}">
+                      <a16:creationId xmlns:a16="http://schemas.microsoft.com/office/drawing/2014/main" id="{EE9A3D31-9DF4-35BE-4B16-5C8DFB5770C1}"/>
+                    </a:ext>
+                  </a:extLst>
+                </p:cNvPr>
+                <p:cNvSpPr txBox="1"/>
+                <p:nvPr/>
+              </p:nvSpPr>
+              <p:spPr>
+                <a:xfrm>
+                  <a:off x="1405478" y="1850914"/>
+                  <a:ext cx="377026" cy="276999"/>
+                </a:xfrm>
+                <a:prstGeom prst="rect">
+                  <a:avLst/>
+                </a:prstGeom>
+                <a:noFill/>
+              </p:spPr>
+              <p:txBody>
+                <a:bodyPr wrap="none" rtlCol="0">
+                  <a:spAutoFit/>
+                </a:bodyPr>
+                <a:lstStyle/>
+                <a:p>
+                  <a:r>
+                    <a:rPr lang="en-US" altLang="zh-CN" sz="1200" dirty="0">
+                      <a:latin typeface="Times New Roman" panose="02020603050405020304" pitchFamily="18" charset="0"/>
+                      <a:ea typeface="阿里巴巴普惠体 Medium" panose="00020600040101010101" pitchFamily="18" charset="-122"/>
+                      <a:cs typeface="Times New Roman" panose="02020603050405020304" pitchFamily="18" charset="0"/>
+                    </a:rPr>
+                    <a:t>1.0</a:t>
+                  </a:r>
+                  <a:endParaRPr lang="zh-CN" altLang="en-US" sz="1200" dirty="0">
+                    <a:latin typeface="Times New Roman" panose="02020603050405020304" pitchFamily="18" charset="0"/>
+                    <a:ea typeface="阿里巴巴普惠体 Medium" panose="00020600040101010101" pitchFamily="18" charset="-122"/>
+                    <a:cs typeface="Times New Roman" panose="02020603050405020304" pitchFamily="18" charset="0"/>
+                  </a:endParaRPr>
+                </a:p>
+              </p:txBody>
+            </p:sp>
+            <p:cxnSp>
+              <p:nvCxnSpPr>
+                <p:cNvPr id="57" name="直接连接符 56">
+                  <a:extLst>
+                    <a:ext uri="{FF2B5EF4-FFF2-40B4-BE49-F238E27FC236}">
+                      <a16:creationId xmlns:a16="http://schemas.microsoft.com/office/drawing/2014/main" id="{5674FF67-9F49-8549-173D-D2DF5E07C961}"/>
+                    </a:ext>
+                  </a:extLst>
+                </p:cNvPr>
+                <p:cNvCxnSpPr>
+                  <a:cxnSpLocks/>
+                </p:cNvCxnSpPr>
+                <p:nvPr/>
+              </p:nvCxnSpPr>
+              <p:spPr>
+                <a:xfrm flipH="1">
+                  <a:off x="1774071" y="3428752"/>
+                  <a:ext cx="432049" cy="0"/>
+                </a:xfrm>
+                <a:prstGeom prst="line">
+                  <a:avLst/>
+                </a:prstGeom>
+                <a:ln w="12700">
+                  <a:solidFill>
+                    <a:schemeClr val="tx1"/>
+                  </a:solidFill>
+                  <a:prstDash val="dash"/>
+                </a:ln>
+              </p:spPr>
+              <p:style>
+                <a:lnRef idx="1">
+                  <a:schemeClr val="dk1"/>
+                </a:lnRef>
+                <a:fillRef idx="0">
+                  <a:schemeClr val="dk1"/>
+                </a:fillRef>
+                <a:effectRef idx="0">
+                  <a:schemeClr val="dk1"/>
+                </a:effectRef>
+                <a:fontRef idx="minor">
+                  <a:schemeClr val="tx1"/>
+                </a:fontRef>
+              </p:style>
+            </p:cxnSp>
+            <p:cxnSp>
+              <p:nvCxnSpPr>
+                <p:cNvPr id="59" name="直接连接符 58">
+                  <a:extLst>
+                    <a:ext uri="{FF2B5EF4-FFF2-40B4-BE49-F238E27FC236}">
+                      <a16:creationId xmlns:a16="http://schemas.microsoft.com/office/drawing/2014/main" id="{2DE351D6-9738-F047-3EDD-53E4D0D6439A}"/>
+                    </a:ext>
+                  </a:extLst>
+                </p:cNvPr>
+                <p:cNvCxnSpPr>
+                  <a:cxnSpLocks/>
+                </p:cNvCxnSpPr>
+                <p:nvPr/>
+              </p:nvCxnSpPr>
+              <p:spPr>
+                <a:xfrm flipH="1">
+                  <a:off x="1774022" y="2348632"/>
+                  <a:ext cx="923996" cy="0"/>
+                </a:xfrm>
+                <a:prstGeom prst="line">
+                  <a:avLst/>
+                </a:prstGeom>
+                <a:ln w="12700">
+                  <a:solidFill>
+                    <a:schemeClr val="tx1"/>
+                  </a:solidFill>
+                  <a:prstDash val="dash"/>
+                </a:ln>
+              </p:spPr>
+              <p:style>
+                <a:lnRef idx="1">
+                  <a:schemeClr val="dk1"/>
+                </a:lnRef>
+                <a:fillRef idx="0">
+                  <a:schemeClr val="dk1"/>
+                </a:fillRef>
+                <a:effectRef idx="0">
+                  <a:schemeClr val="dk1"/>
+                </a:effectRef>
+                <a:fontRef idx="minor">
+                  <a:schemeClr val="tx1"/>
+                </a:fontRef>
+              </p:style>
+            </p:cxnSp>
+            <p:cxnSp>
+              <p:nvCxnSpPr>
+                <p:cNvPr id="61" name="直接连接符 60">
+                  <a:extLst>
+                    <a:ext uri="{FF2B5EF4-FFF2-40B4-BE49-F238E27FC236}">
+                      <a16:creationId xmlns:a16="http://schemas.microsoft.com/office/drawing/2014/main" id="{2DD8E52E-00A0-4AB2-7995-1B5F9C716A68}"/>
+                    </a:ext>
+                  </a:extLst>
+                </p:cNvPr>
+                <p:cNvCxnSpPr>
+                  <a:cxnSpLocks/>
+                </p:cNvCxnSpPr>
+                <p:nvPr/>
+              </p:nvCxnSpPr>
+              <p:spPr>
+                <a:xfrm flipH="1">
+                  <a:off x="1774071" y="1994107"/>
+                  <a:ext cx="1440161" cy="0"/>
+                </a:xfrm>
+                <a:prstGeom prst="line">
+                  <a:avLst/>
+                </a:prstGeom>
+                <a:ln w="12700">
+                  <a:solidFill>
+                    <a:schemeClr val="tx1"/>
+                  </a:solidFill>
+                  <a:prstDash val="dash"/>
+                </a:ln>
+              </p:spPr>
+              <p:style>
+                <a:lnRef idx="1">
+                  <a:schemeClr val="dk1"/>
+                </a:lnRef>
+                <a:fillRef idx="0">
+                  <a:schemeClr val="dk1"/>
+                </a:fillRef>
+                <a:effectRef idx="0">
+                  <a:schemeClr val="dk1"/>
+                </a:effectRef>
+                <a:fontRef idx="minor">
+                  <a:schemeClr val="tx1"/>
+                </a:fontRef>
+              </p:style>
+            </p:cxnSp>
+            <p:cxnSp>
+              <p:nvCxnSpPr>
+                <p:cNvPr id="92" name="直接连接符 91">
+                  <a:extLst>
+                    <a:ext uri="{FF2B5EF4-FFF2-40B4-BE49-F238E27FC236}">
+                      <a16:creationId xmlns:a16="http://schemas.microsoft.com/office/drawing/2014/main" id="{D2AECBF1-4652-083E-1C25-B5EF639B1636}"/>
+                    </a:ext>
+                  </a:extLst>
+                </p:cNvPr>
+                <p:cNvCxnSpPr>
+                  <a:cxnSpLocks/>
+                </p:cNvCxnSpPr>
+                <p:nvPr/>
+              </p:nvCxnSpPr>
+              <p:spPr>
+                <a:xfrm>
+                  <a:off x="2698018" y="2348632"/>
+                  <a:ext cx="510771" cy="0"/>
+                </a:xfrm>
+                <a:prstGeom prst="line">
+                  <a:avLst/>
+                </a:prstGeom>
+                <a:ln w="19050">
+                  <a:solidFill>
+                    <a:schemeClr val="accent1"/>
+                  </a:solidFill>
+                </a:ln>
+              </p:spPr>
+              <p:style>
+                <a:lnRef idx="1">
+                  <a:schemeClr val="dk1"/>
+                </a:lnRef>
+                <a:fillRef idx="0">
+                  <a:schemeClr val="dk1"/>
+                </a:fillRef>
+                <a:effectRef idx="0">
+                  <a:schemeClr val="dk1"/>
+                </a:effectRef>
+                <a:fontRef idx="minor">
+                  <a:schemeClr val="tx1"/>
+                </a:fontRef>
+              </p:style>
+            </p:cxnSp>
+            <p:cxnSp>
+              <p:nvCxnSpPr>
+                <p:cNvPr id="93" name="直接连接符 92">
+                  <a:extLst>
+                    <a:ext uri="{FF2B5EF4-FFF2-40B4-BE49-F238E27FC236}">
+                      <a16:creationId xmlns:a16="http://schemas.microsoft.com/office/drawing/2014/main" id="{9FE96E04-4CB1-9DBA-3D17-65A0472FD0F2}"/>
+                    </a:ext>
+                  </a:extLst>
+                </p:cNvPr>
+                <p:cNvCxnSpPr>
+                  <a:cxnSpLocks/>
+                </p:cNvCxnSpPr>
+                <p:nvPr/>
+              </p:nvCxnSpPr>
+              <p:spPr>
+                <a:xfrm>
+                  <a:off x="3214232" y="1994107"/>
+                  <a:ext cx="812804" cy="0"/>
+                </a:xfrm>
+                <a:prstGeom prst="line">
+                  <a:avLst/>
+                </a:prstGeom>
+                <a:ln w="19050">
+                  <a:solidFill>
+                    <a:schemeClr val="accent1"/>
+                  </a:solidFill>
+                </a:ln>
+              </p:spPr>
+              <p:style>
+                <a:lnRef idx="1">
+                  <a:schemeClr val="dk1"/>
+                </a:lnRef>
+                <a:fillRef idx="0">
+                  <a:schemeClr val="dk1"/>
+                </a:fillRef>
+                <a:effectRef idx="0">
+                  <a:schemeClr val="dk1"/>
+                </a:effectRef>
+                <a:fontRef idx="minor">
+                  <a:schemeClr val="tx1"/>
+                </a:fontRef>
+              </p:style>
+            </p:cxnSp>
+            <p:cxnSp>
+              <p:nvCxnSpPr>
+                <p:cNvPr id="103" name="直接连接符 102">
+                  <a:extLst>
+                    <a:ext uri="{FF2B5EF4-FFF2-40B4-BE49-F238E27FC236}">
+                      <a16:creationId xmlns:a16="http://schemas.microsoft.com/office/drawing/2014/main" id="{DEFCA64D-74E1-BE3B-4096-6EECEBB540DF}"/>
+                    </a:ext>
+                  </a:extLst>
+                </p:cNvPr>
+                <p:cNvCxnSpPr>
+                  <a:cxnSpLocks/>
+                </p:cNvCxnSpPr>
+                <p:nvPr/>
+              </p:nvCxnSpPr>
+              <p:spPr>
+                <a:xfrm flipV="1">
+                  <a:off x="2705843" y="3427879"/>
+                  <a:ext cx="0" cy="432673"/>
+                </a:xfrm>
+                <a:prstGeom prst="line">
+                  <a:avLst/>
+                </a:prstGeom>
+                <a:ln w="12700">
+                  <a:solidFill>
+                    <a:schemeClr val="tx1"/>
+                  </a:solidFill>
+                  <a:prstDash val="dash"/>
+                </a:ln>
+              </p:spPr>
+              <p:style>
+                <a:lnRef idx="1">
+                  <a:schemeClr val="dk1"/>
+                </a:lnRef>
+                <a:fillRef idx="0">
+                  <a:schemeClr val="dk1"/>
+                </a:fillRef>
+                <a:effectRef idx="0">
+                  <a:schemeClr val="dk1"/>
+                </a:effectRef>
+                <a:fontRef idx="minor">
+                  <a:schemeClr val="tx1"/>
+                </a:fontRef>
+              </p:style>
+            </p:cxnSp>
+            <p:cxnSp>
+              <p:nvCxnSpPr>
+                <p:cNvPr id="106" name="直接连接符 105">
+                  <a:extLst>
+                    <a:ext uri="{FF2B5EF4-FFF2-40B4-BE49-F238E27FC236}">
+                      <a16:creationId xmlns:a16="http://schemas.microsoft.com/office/drawing/2014/main" id="{CA4B84E2-1ED8-7C45-F8B8-5EC788BFDAE2}"/>
+                    </a:ext>
+                  </a:extLst>
+                </p:cNvPr>
+                <p:cNvCxnSpPr>
+                  <a:cxnSpLocks/>
+                </p:cNvCxnSpPr>
+                <p:nvPr/>
+              </p:nvCxnSpPr>
+              <p:spPr>
+                <a:xfrm flipV="1">
+                  <a:off x="3208788" y="2349085"/>
+                  <a:ext cx="0" cy="1505117"/>
+                </a:xfrm>
+                <a:prstGeom prst="line">
+                  <a:avLst/>
+                </a:prstGeom>
+                <a:ln w="12700">
+                  <a:solidFill>
+                    <a:schemeClr val="tx1"/>
+                  </a:solidFill>
+                  <a:prstDash val="dash"/>
+                </a:ln>
+              </p:spPr>
+              <p:style>
+                <a:lnRef idx="1">
+                  <a:schemeClr val="dk1"/>
+                </a:lnRef>
+                <a:fillRef idx="0">
+                  <a:schemeClr val="dk1"/>
+                </a:fillRef>
+                <a:effectRef idx="0">
+                  <a:schemeClr val="dk1"/>
+                </a:effectRef>
+                <a:fontRef idx="minor">
+                  <a:schemeClr val="tx1"/>
+                </a:fontRef>
+              </p:style>
+            </p:cxnSp>
+            <p:sp>
+              <p:nvSpPr>
+                <p:cNvPr id="113" name="椭圆 112">
+                  <a:extLst>
+                    <a:ext uri="{FF2B5EF4-FFF2-40B4-BE49-F238E27FC236}">
+                      <a16:creationId xmlns:a16="http://schemas.microsoft.com/office/drawing/2014/main" id="{53AC7213-C11E-2BFA-4213-49467BD857BC}"/>
+                    </a:ext>
+                  </a:extLst>
+                </p:cNvPr>
+                <p:cNvSpPr/>
+                <p:nvPr/>
+              </p:nvSpPr>
+              <p:spPr>
+                <a:xfrm>
+                  <a:off x="2182323" y="3405018"/>
+                  <a:ext cx="45719" cy="45719"/>
+                </a:xfrm>
+                <a:prstGeom prst="ellipse">
+                  <a:avLst/>
+                </a:prstGeom>
+                <a:solidFill>
+                  <a:schemeClr val="tx1"/>
+                </a:solidFill>
+                <a:ln>
+                  <a:solidFill>
+                    <a:schemeClr val="tx1"/>
+                  </a:solidFill>
+                </a:ln>
+              </p:spPr>
+              <p:style>
+                <a:lnRef idx="2">
+                  <a:schemeClr val="accent1">
+                    <a:shade val="50000"/>
+                  </a:schemeClr>
+                </a:lnRef>
+                <a:fillRef idx="1">
+                  <a:schemeClr val="accent1"/>
+                </a:fillRef>
+                <a:effectRef idx="0">
+                  <a:schemeClr val="accent1"/>
+                </a:effectRef>
+                <a:fontRef idx="minor">
+                  <a:schemeClr val="lt1"/>
+                </a:fontRef>
+              </p:style>
+              <p:txBody>
+                <a:bodyPr rtlCol="0" anchor="ctr"/>
+                <a:lstStyle/>
+                <a:p>
+                  <a:pPr algn="ctr"/>
+                  <a:endParaRPr lang="zh-CN" altLang="en-US"/>
+                </a:p>
+              </p:txBody>
+            </p:sp>
+            <p:sp>
+              <p:nvSpPr>
+                <p:cNvPr id="114" name="椭圆 113">
+                  <a:extLst>
+                    <a:ext uri="{FF2B5EF4-FFF2-40B4-BE49-F238E27FC236}">
+                      <a16:creationId xmlns:a16="http://schemas.microsoft.com/office/drawing/2014/main" id="{97AB0DCC-5B70-56DC-899C-09B8A4D9B533}"/>
+                    </a:ext>
+                  </a:extLst>
+                </p:cNvPr>
+                <p:cNvSpPr/>
+                <p:nvPr/>
+              </p:nvSpPr>
+              <p:spPr>
+                <a:xfrm>
+                  <a:off x="2682983" y="2324897"/>
+                  <a:ext cx="45719" cy="45719"/>
+                </a:xfrm>
+                <a:prstGeom prst="ellipse">
+                  <a:avLst/>
+                </a:prstGeom>
+                <a:solidFill>
+                  <a:schemeClr val="tx1"/>
+                </a:solidFill>
+                <a:ln>
+                  <a:solidFill>
+                    <a:schemeClr val="tx1"/>
+                  </a:solidFill>
+                </a:ln>
+              </p:spPr>
+              <p:style>
+                <a:lnRef idx="2">
+                  <a:schemeClr val="accent1">
+                    <a:shade val="50000"/>
+                  </a:schemeClr>
+                </a:lnRef>
+                <a:fillRef idx="1">
+                  <a:schemeClr val="accent1"/>
+                </a:fillRef>
+                <a:effectRef idx="0">
+                  <a:schemeClr val="accent1"/>
+                </a:effectRef>
+                <a:fontRef idx="minor">
+                  <a:schemeClr val="lt1"/>
+                </a:fontRef>
+              </p:style>
+              <p:txBody>
+                <a:bodyPr rtlCol="0" anchor="ctr"/>
+                <a:lstStyle/>
+                <a:p>
+                  <a:pPr algn="ctr"/>
+                  <a:endParaRPr lang="zh-CN" altLang="en-US"/>
+                </a:p>
+              </p:txBody>
+            </p:sp>
+            <p:sp>
+              <p:nvSpPr>
+                <p:cNvPr id="115" name="椭圆 114">
+                  <a:extLst>
+                    <a:ext uri="{FF2B5EF4-FFF2-40B4-BE49-F238E27FC236}">
+                      <a16:creationId xmlns:a16="http://schemas.microsoft.com/office/drawing/2014/main" id="{A3360B79-6706-6B53-6948-D13A263C3196}"/>
+                    </a:ext>
+                  </a:extLst>
+                </p:cNvPr>
+                <p:cNvSpPr/>
+                <p:nvPr/>
+              </p:nvSpPr>
+              <p:spPr>
+                <a:xfrm>
+                  <a:off x="3185928" y="1970492"/>
+                  <a:ext cx="45719" cy="45719"/>
+                </a:xfrm>
+                <a:prstGeom prst="ellipse">
+                  <a:avLst/>
+                </a:prstGeom>
+                <a:solidFill>
+                  <a:schemeClr val="tx1"/>
+                </a:solidFill>
+                <a:ln>
+                  <a:solidFill>
+                    <a:schemeClr val="tx1"/>
+                  </a:solidFill>
+                </a:ln>
+              </p:spPr>
+              <p:style>
+                <a:lnRef idx="2">
+                  <a:schemeClr val="accent1">
+                    <a:shade val="50000"/>
+                  </a:schemeClr>
+                </a:lnRef>
+                <a:fillRef idx="1">
+                  <a:schemeClr val="accent1"/>
+                </a:fillRef>
+                <a:effectRef idx="0">
+                  <a:schemeClr val="accent1"/>
+                </a:effectRef>
+                <a:fontRef idx="minor">
+                  <a:schemeClr val="lt1"/>
+                </a:fontRef>
+              </p:style>
+              <p:txBody>
+                <a:bodyPr rtlCol="0" anchor="ctr"/>
+                <a:lstStyle/>
+                <a:p>
+                  <a:pPr algn="ctr"/>
+                  <a:endParaRPr lang="zh-CN" altLang="en-US"/>
+                </a:p>
+              </p:txBody>
+            </p:sp>
+            <p:sp>
+              <p:nvSpPr>
+                <p:cNvPr id="116" name="椭圆 115">
+                  <a:extLst>
+                    <a:ext uri="{FF2B5EF4-FFF2-40B4-BE49-F238E27FC236}">
+                      <a16:creationId xmlns:a16="http://schemas.microsoft.com/office/drawing/2014/main" id="{00A507F7-B31D-2CBF-20D9-95F017F3FC63}"/>
+                    </a:ext>
+                  </a:extLst>
+                </p:cNvPr>
+                <p:cNvSpPr/>
+                <p:nvPr/>
+              </p:nvSpPr>
+              <p:spPr>
+                <a:xfrm>
+                  <a:off x="2676386" y="3395124"/>
+                  <a:ext cx="58914" cy="58914"/>
+                </a:xfrm>
+                <a:prstGeom prst="ellipse">
+                  <a:avLst/>
+                </a:prstGeom>
+                <a:noFill/>
+                <a:ln>
+                  <a:solidFill>
+                    <a:schemeClr val="tx1"/>
+                  </a:solidFill>
+                </a:ln>
+              </p:spPr>
+              <p:style>
+                <a:lnRef idx="2">
+                  <a:schemeClr val="accent1">
+                    <a:shade val="50000"/>
+                  </a:schemeClr>
+                </a:lnRef>
+                <a:fillRef idx="1">
+                  <a:schemeClr val="accent1"/>
+                </a:fillRef>
+                <a:effectRef idx="0">
+                  <a:schemeClr val="accent1"/>
+                </a:effectRef>
+                <a:fontRef idx="minor">
+                  <a:schemeClr val="lt1"/>
+                </a:fontRef>
+              </p:style>
+              <p:txBody>
+                <a:bodyPr rtlCol="0" anchor="ctr"/>
+                <a:lstStyle/>
+                <a:p>
+                  <a:pPr algn="ctr"/>
+                  <a:endParaRPr lang="zh-CN" altLang="en-US"/>
+                </a:p>
+              </p:txBody>
+            </p:sp>
+            <p:sp>
+              <p:nvSpPr>
+                <p:cNvPr id="117" name="椭圆 116">
+                  <a:extLst>
+                    <a:ext uri="{FF2B5EF4-FFF2-40B4-BE49-F238E27FC236}">
+                      <a16:creationId xmlns:a16="http://schemas.microsoft.com/office/drawing/2014/main" id="{6A8F8D84-1B32-39DE-18A4-E41E9DB11B42}"/>
+                    </a:ext>
+                  </a:extLst>
+                </p:cNvPr>
+                <p:cNvSpPr/>
+                <p:nvPr/>
+              </p:nvSpPr>
+              <p:spPr>
+                <a:xfrm>
+                  <a:off x="2176553" y="3827040"/>
+                  <a:ext cx="58920" cy="58920"/>
+                </a:xfrm>
+                <a:prstGeom prst="ellipse">
+                  <a:avLst/>
+                </a:prstGeom>
+                <a:noFill/>
+                <a:ln>
+                  <a:solidFill>
+                    <a:schemeClr val="tx1"/>
+                  </a:solidFill>
+                </a:ln>
+              </p:spPr>
+              <p:style>
+                <a:lnRef idx="2">
+                  <a:schemeClr val="accent1">
+                    <a:shade val="50000"/>
+                  </a:schemeClr>
+                </a:lnRef>
+                <a:fillRef idx="1">
+                  <a:schemeClr val="accent1"/>
+                </a:fillRef>
+                <a:effectRef idx="0">
+                  <a:schemeClr val="accent1"/>
+                </a:effectRef>
+                <a:fontRef idx="minor">
+                  <a:schemeClr val="lt1"/>
+                </a:fontRef>
+              </p:style>
+              <p:txBody>
+                <a:bodyPr rtlCol="0" anchor="ctr"/>
+                <a:lstStyle/>
+                <a:p>
+                  <a:pPr algn="ctr"/>
+                  <a:endParaRPr lang="zh-CN" altLang="en-US"/>
+                </a:p>
+              </p:txBody>
+            </p:sp>
+            <p:sp>
+              <p:nvSpPr>
+                <p:cNvPr id="118" name="椭圆 117">
+                  <a:extLst>
+                    <a:ext uri="{FF2B5EF4-FFF2-40B4-BE49-F238E27FC236}">
+                      <a16:creationId xmlns:a16="http://schemas.microsoft.com/office/drawing/2014/main" id="{E599BD55-158D-0F3F-8740-A5DA0448541E}"/>
+                    </a:ext>
+                  </a:extLst>
+                </p:cNvPr>
+                <p:cNvSpPr/>
+                <p:nvPr/>
+              </p:nvSpPr>
+              <p:spPr>
+                <a:xfrm>
+                  <a:off x="3179330" y="2316329"/>
+                  <a:ext cx="58916" cy="58916"/>
+                </a:xfrm>
+                <a:prstGeom prst="ellipse">
+                  <a:avLst/>
+                </a:prstGeom>
+                <a:noFill/>
+                <a:ln>
+                  <a:solidFill>
+                    <a:schemeClr val="tx1"/>
+                  </a:solidFill>
+                </a:ln>
+              </p:spPr>
+              <p:style>
+                <a:lnRef idx="2">
+                  <a:schemeClr val="accent1">
+                    <a:shade val="50000"/>
+                  </a:schemeClr>
+                </a:lnRef>
+                <a:fillRef idx="1">
+                  <a:schemeClr val="accent1"/>
+                </a:fillRef>
+                <a:effectRef idx="0">
+                  <a:schemeClr val="accent1"/>
+                </a:effectRef>
+                <a:fontRef idx="minor">
+                  <a:schemeClr val="lt1"/>
+                </a:fontRef>
+              </p:style>
+              <p:txBody>
+                <a:bodyPr rtlCol="0" anchor="ctr"/>
+                <a:lstStyle/>
+                <a:p>
+                  <a:pPr algn="ctr"/>
+                  <a:endParaRPr lang="zh-CN" altLang="en-US"/>
+                </a:p>
+              </p:txBody>
+            </p:sp>
+            <p:sp>
+              <p:nvSpPr>
+                <p:cNvPr id="2" name="椭圆 1">
+                  <a:extLst>
+                    <a:ext uri="{FF2B5EF4-FFF2-40B4-BE49-F238E27FC236}">
+                      <a16:creationId xmlns:a16="http://schemas.microsoft.com/office/drawing/2014/main" id="{2D19FC02-950A-CD64-5387-34BDA3A1C3AA}"/>
+                    </a:ext>
+                  </a:extLst>
+                </p:cNvPr>
+                <p:cNvSpPr/>
+                <p:nvPr/>
+              </p:nvSpPr>
+              <p:spPr>
+                <a:xfrm>
+                  <a:off x="1751162" y="3837943"/>
+                  <a:ext cx="45719" cy="45719"/>
+                </a:xfrm>
+                <a:prstGeom prst="ellipse">
+                  <a:avLst/>
+                </a:prstGeom>
+                <a:solidFill>
+                  <a:schemeClr val="tx1"/>
+                </a:solidFill>
+                <a:ln>
+                  <a:solidFill>
+                    <a:schemeClr val="tx1"/>
+                  </a:solidFill>
+                </a:ln>
+              </p:spPr>
+              <p:style>
+                <a:lnRef idx="2">
+                  <a:schemeClr val="accent1">
+                    <a:shade val="50000"/>
+                  </a:schemeClr>
+                </a:lnRef>
+                <a:fillRef idx="1">
+                  <a:schemeClr val="accent1"/>
+                </a:fillRef>
+                <a:effectRef idx="0">
+                  <a:schemeClr val="accent1"/>
+                </a:effectRef>
+                <a:fontRef idx="minor">
+                  <a:schemeClr val="lt1"/>
+                </a:fontRef>
+              </p:style>
+              <p:txBody>
+                <a:bodyPr rtlCol="0" anchor="ctr"/>
+                <a:lstStyle/>
+                <a:p>
+                  <a:pPr algn="ctr"/>
+                  <a:endParaRPr lang="zh-CN" altLang="en-US"/>
+                </a:p>
+              </p:txBody>
+            </p:sp>
+            <p:sp>
+              <p:nvSpPr>
+                <p:cNvPr id="58" name="文本框 57">
+                  <a:extLst>
+                    <a:ext uri="{FF2B5EF4-FFF2-40B4-BE49-F238E27FC236}">
+                      <a16:creationId xmlns:a16="http://schemas.microsoft.com/office/drawing/2014/main" id="{E243B69C-7E1B-1DFE-299B-7AC4E85B881F}"/>
+                    </a:ext>
+                  </a:extLst>
+                </p:cNvPr>
+                <p:cNvSpPr txBox="1"/>
+                <p:nvPr/>
+              </p:nvSpPr>
+              <p:spPr>
+                <a:xfrm>
+                  <a:off x="2184198" y="3500531"/>
+                  <a:ext cx="453970" cy="276999"/>
+                </a:xfrm>
+                <a:prstGeom prst="rect">
+                  <a:avLst/>
+                </a:prstGeom>
+                <a:noFill/>
+              </p:spPr>
+              <p:txBody>
+                <a:bodyPr wrap="none" rtlCol="0">
+                  <a:spAutoFit/>
+                </a:bodyPr>
+                <a:lstStyle/>
+                <a:p>
+                  <a:r>
+                    <a:rPr lang="en-US" altLang="zh-CN" sz="1200" dirty="0">
+                      <a:latin typeface="Times New Roman" panose="02020603050405020304" pitchFamily="18" charset="0"/>
+                      <a:ea typeface="阿里巴巴普惠体 Medium" panose="00020600040101010101" pitchFamily="18" charset="-122"/>
+                      <a:cs typeface="Times New Roman" panose="02020603050405020304" pitchFamily="18" charset="0"/>
+                    </a:rPr>
+                    <a:t>0.25</a:t>
+                  </a:r>
+                  <a:endParaRPr lang="zh-CN" altLang="en-US" sz="1200" dirty="0">
+                    <a:latin typeface="Times New Roman" panose="02020603050405020304" pitchFamily="18" charset="0"/>
+                    <a:ea typeface="阿里巴巴普惠体 Medium" panose="00020600040101010101" pitchFamily="18" charset="-122"/>
+                    <a:cs typeface="Times New Roman" panose="02020603050405020304" pitchFamily="18" charset="0"/>
+                  </a:endParaRPr>
+                </a:p>
+              </p:txBody>
+            </p:sp>
+            <p:sp>
+              <p:nvSpPr>
+                <p:cNvPr id="60" name="文本框 59">
+                  <a:extLst>
+                    <a:ext uri="{FF2B5EF4-FFF2-40B4-BE49-F238E27FC236}">
+                      <a16:creationId xmlns:a16="http://schemas.microsoft.com/office/drawing/2014/main" id="{DA79801B-EB41-19F8-71A1-320C66D7934D}"/>
+                    </a:ext>
+                  </a:extLst>
+                </p:cNvPr>
+                <p:cNvSpPr txBox="1"/>
+                <p:nvPr/>
+              </p:nvSpPr>
+              <p:spPr>
+                <a:xfrm>
+                  <a:off x="2693190" y="2788707"/>
+                  <a:ext cx="377026" cy="276999"/>
+                </a:xfrm>
+                <a:prstGeom prst="rect">
+                  <a:avLst/>
+                </a:prstGeom>
+                <a:noFill/>
+              </p:spPr>
+              <p:txBody>
+                <a:bodyPr wrap="none" rtlCol="0">
+                  <a:spAutoFit/>
+                </a:bodyPr>
+                <a:lstStyle/>
+                <a:p>
+                  <a:r>
+                    <a:rPr lang="en-US" altLang="zh-CN" sz="1200" dirty="0">
+                      <a:latin typeface="Times New Roman" panose="02020603050405020304" pitchFamily="18" charset="0"/>
+                      <a:ea typeface="阿里巴巴普惠体 Medium" panose="00020600040101010101" pitchFamily="18" charset="-122"/>
+                      <a:cs typeface="Times New Roman" panose="02020603050405020304" pitchFamily="18" charset="0"/>
+                    </a:rPr>
+                    <a:t>0.6</a:t>
+                  </a:r>
+                  <a:endParaRPr lang="zh-CN" altLang="en-US" sz="1200" dirty="0">
+                    <a:latin typeface="Times New Roman" panose="02020603050405020304" pitchFamily="18" charset="0"/>
+                    <a:ea typeface="阿里巴巴普惠体 Medium" panose="00020600040101010101" pitchFamily="18" charset="-122"/>
+                    <a:cs typeface="Times New Roman" panose="02020603050405020304" pitchFamily="18" charset="0"/>
+                  </a:endParaRPr>
+                </a:p>
+              </p:txBody>
+            </p:sp>
+            <p:graphicFrame>
+              <p:nvGraphicFramePr>
+                <p:cNvPr id="89" name="对象 88">
+                  <a:extLst>
+                    <a:ext uri="{FF2B5EF4-FFF2-40B4-BE49-F238E27FC236}">
+                      <a16:creationId xmlns:a16="http://schemas.microsoft.com/office/drawing/2014/main" id="{47166154-7E09-B123-5BF2-6D8E2F999D64}"/>
+                    </a:ext>
+                  </a:extLst>
+                </p:cNvPr>
+                <p:cNvGraphicFramePr>
+                  <a:graphicFrameLocks noChangeAspect="1"/>
+                </p:cNvGraphicFramePr>
+                <p:nvPr>
+                  <p:extLst>
+                    <p:ext uri="{D42A27DB-BD31-4B8C-83A1-F6EECF244321}">
+                      <p14:modId xmlns:p14="http://schemas.microsoft.com/office/powerpoint/2010/main" val="213614529"/>
+                    </p:ext>
+                  </p:extLst>
+                </p:nvPr>
+              </p:nvGraphicFramePr>
+              <p:xfrm>
+                <a:off x="2599592" y="3856382"/>
+                <a:ext cx="195297" cy="266314"/>
+              </p:xfrm>
+              <a:graphic>
+                <a:graphicData uri="http://schemas.openxmlformats.org/presentationml/2006/ole">
+                  <mc:AlternateContent xmlns:mc="http://schemas.openxmlformats.org/markup-compatibility/2006">
+                    <mc:Choice xmlns:v="urn:schemas-microsoft-com:vml" Requires="v">
+                      <p:oleObj name="AxMath" r:id="rId2" imgW="139320" imgH="189720" progId="Equation.AxMath">
+                        <p:embed/>
+                      </p:oleObj>
+                    </mc:Choice>
+                    <mc:Fallback>
+                      <p:oleObj name="AxMath" r:id="rId2" imgW="139320" imgH="189720" progId="Equation.AxMath">
+                        <p:embed/>
+                        <p:pic>
+                          <p:nvPicPr>
+                            <p:cNvPr id="10" name="对象 9">
+                              <a:extLst>
+                                <a:ext uri="{FF2B5EF4-FFF2-40B4-BE49-F238E27FC236}">
+                                  <a16:creationId xmlns:a16="http://schemas.microsoft.com/office/drawing/2014/main" id="{9A3A4EA4-4FF7-08AB-69B5-60B02F290DC0}"/>
+                                </a:ext>
+                              </a:extLst>
+                            </p:cNvPr>
+                            <p:cNvPicPr/>
+                            <p:nvPr/>
+                          </p:nvPicPr>
+                          <p:blipFill>
+                            <a:blip r:embed="rId3"/>
+                            <a:stretch>
+                              <a:fillRect/>
+                            </a:stretch>
+                          </p:blipFill>
+                          <p:spPr>
+                            <a:xfrm>
+                              <a:off x="2599592" y="3856382"/>
+                              <a:ext cx="195297" cy="266314"/>
+                            </a:xfrm>
+                            <a:prstGeom prst="rect">
+                              <a:avLst/>
+                            </a:prstGeom>
+                          </p:spPr>
+                        </p:pic>
+                      </p:oleObj>
+                    </mc:Fallback>
+                  </mc:AlternateContent>
+                </a:graphicData>
+              </a:graphic>
+            </p:graphicFrame>
+            <p:graphicFrame>
+              <p:nvGraphicFramePr>
+                <p:cNvPr id="90" name="对象 89">
+                  <a:extLst>
+                    <a:ext uri="{FF2B5EF4-FFF2-40B4-BE49-F238E27FC236}">
+                      <a16:creationId xmlns:a16="http://schemas.microsoft.com/office/drawing/2014/main" id="{B6A348B8-661E-A683-0914-DD9F795731D1}"/>
+                    </a:ext>
+                  </a:extLst>
+                </p:cNvPr>
+                <p:cNvGraphicFramePr>
+                  <a:graphicFrameLocks noChangeAspect="1"/>
+                </p:cNvGraphicFramePr>
+                <p:nvPr>
+                  <p:extLst>
+                    <p:ext uri="{D42A27DB-BD31-4B8C-83A1-F6EECF244321}">
+                      <p14:modId xmlns:p14="http://schemas.microsoft.com/office/powerpoint/2010/main" val="531972300"/>
+                    </p:ext>
+                  </p:extLst>
+                </p:nvPr>
+              </p:nvGraphicFramePr>
+              <p:xfrm>
+                <a:off x="3109787" y="3855887"/>
+                <a:ext cx="194309" cy="274567"/>
+              </p:xfrm>
+              <a:graphic>
+                <a:graphicData uri="http://schemas.openxmlformats.org/presentationml/2006/ole">
+                  <mc:AlternateContent xmlns:mc="http://schemas.openxmlformats.org/markup-compatibility/2006">
+                    <mc:Choice xmlns:v="urn:schemas-microsoft-com:vml" Requires="v">
+                      <p:oleObj name="AxMath" r:id="rId4" imgW="134280" imgH="189720" progId="Equation.AxMath">
+                        <p:embed/>
+                      </p:oleObj>
+                    </mc:Choice>
+                    <mc:Fallback>
+                      <p:oleObj name="AxMath" r:id="rId4" imgW="134280" imgH="189720" progId="Equation.AxMath">
+                        <p:embed/>
+                        <p:pic>
+                          <p:nvPicPr>
+                            <p:cNvPr id="11" name="对象 10">
+                              <a:extLst>
+                                <a:ext uri="{FF2B5EF4-FFF2-40B4-BE49-F238E27FC236}">
+                                  <a16:creationId xmlns:a16="http://schemas.microsoft.com/office/drawing/2014/main" id="{C038B34A-A9AF-4CEE-2DC9-9C9FB142EFAC}"/>
+                                </a:ext>
+                              </a:extLst>
+                            </p:cNvPr>
+                            <p:cNvPicPr/>
+                            <p:nvPr/>
+                          </p:nvPicPr>
+                          <p:blipFill>
+                            <a:blip r:embed="rId5"/>
+                            <a:stretch>
+                              <a:fillRect/>
+                            </a:stretch>
+                          </p:blipFill>
+                          <p:spPr>
+                            <a:xfrm>
+                              <a:off x="3109787" y="3855887"/>
+                              <a:ext cx="194309" cy="274567"/>
+                            </a:xfrm>
+                            <a:prstGeom prst="rect">
+                              <a:avLst/>
+                            </a:prstGeom>
+                          </p:spPr>
+                        </p:pic>
+                      </p:oleObj>
+                    </mc:Fallback>
+                  </mc:AlternateContent>
+                </a:graphicData>
+              </a:graphic>
+            </p:graphicFrame>
+            <p:graphicFrame>
+              <p:nvGraphicFramePr>
+                <p:cNvPr id="91" name="对象 90">
+                  <a:extLst>
+                    <a:ext uri="{FF2B5EF4-FFF2-40B4-BE49-F238E27FC236}">
+                      <a16:creationId xmlns:a16="http://schemas.microsoft.com/office/drawing/2014/main" id="{FFD6C02F-0CDD-34E3-5208-0CCFA217277F}"/>
+                    </a:ext>
+                  </a:extLst>
+                </p:cNvPr>
+                <p:cNvGraphicFramePr>
+                  <a:graphicFrameLocks noChangeAspect="1"/>
+                </p:cNvGraphicFramePr>
+                <p:nvPr>
+                  <p:extLst>
+                    <p:ext uri="{D42A27DB-BD31-4B8C-83A1-F6EECF244321}">
+                      <p14:modId xmlns:p14="http://schemas.microsoft.com/office/powerpoint/2010/main" val="3141472240"/>
+                    </p:ext>
+                  </p:extLst>
+                </p:nvPr>
+              </p:nvGraphicFramePr>
+              <p:xfrm>
+                <a:off x="2106871" y="3856382"/>
+                <a:ext cx="176213" cy="265112"/>
+              </p:xfrm>
+              <a:graphic>
+                <a:graphicData uri="http://schemas.openxmlformats.org/presentationml/2006/ole">
+                  <mc:AlternateContent xmlns:mc="http://schemas.openxmlformats.org/markup-compatibility/2006">
+                    <mc:Choice xmlns:v="urn:schemas-microsoft-com:vml" Requires="v">
+                      <p:oleObj name="AxMath" r:id="rId16" imgW="124920" imgH="189720" progId="Equation.AxMath">
+                        <p:embed/>
+                      </p:oleObj>
+                    </mc:Choice>
+                    <mc:Fallback>
+                      <p:oleObj name="AxMath" r:id="rId16" imgW="124920" imgH="189720" progId="Equation.AxMath">
+                        <p:embed/>
+                        <p:pic>
+                          <p:nvPicPr>
+                            <p:cNvPr id="85" name="对象 84">
+                              <a:extLst>
+                                <a:ext uri="{FF2B5EF4-FFF2-40B4-BE49-F238E27FC236}">
+                                  <a16:creationId xmlns:a16="http://schemas.microsoft.com/office/drawing/2014/main" id="{CFC3D312-D7EC-3F21-562A-CB2C7F512081}"/>
+                                </a:ext>
+                              </a:extLst>
+                            </p:cNvPr>
+                            <p:cNvPicPr/>
+                            <p:nvPr/>
+                          </p:nvPicPr>
+                          <p:blipFill>
+                            <a:blip r:embed="rId9"/>
+                            <a:stretch>
+                              <a:fillRect/>
+                            </a:stretch>
+                          </p:blipFill>
+                          <p:spPr>
+                            <a:xfrm>
+                              <a:off x="2106871" y="3856382"/>
+                              <a:ext cx="176213" cy="265112"/>
+                            </a:xfrm>
+                            <a:prstGeom prst="rect">
+                              <a:avLst/>
+                            </a:prstGeom>
+                          </p:spPr>
+                        </p:pic>
+                      </p:oleObj>
+                    </mc:Fallback>
+                  </mc:AlternateContent>
+                </a:graphicData>
+              </a:graphic>
+            </p:graphicFrame>
+            <p:graphicFrame>
+              <p:nvGraphicFramePr>
+                <p:cNvPr id="94" name="对象 93">
+                  <a:extLst>
+                    <a:ext uri="{FF2B5EF4-FFF2-40B4-BE49-F238E27FC236}">
+                      <a16:creationId xmlns:a16="http://schemas.microsoft.com/office/drawing/2014/main" id="{C5A1ADF3-5536-3D0A-AC5C-AA9C0B8DA7CD}"/>
+                    </a:ext>
+                  </a:extLst>
+                </p:cNvPr>
+                <p:cNvGraphicFramePr>
+                  <a:graphicFrameLocks noChangeAspect="1"/>
+                </p:cNvGraphicFramePr>
+                <p:nvPr>
+                  <p:extLst>
+                    <p:ext uri="{D42A27DB-BD31-4B8C-83A1-F6EECF244321}">
+                      <p14:modId xmlns:p14="http://schemas.microsoft.com/office/powerpoint/2010/main" val="713372087"/>
+                    </p:ext>
+                  </p:extLst>
+                </p:nvPr>
+              </p:nvGraphicFramePr>
+              <p:xfrm>
+                <a:off x="4330152" y="3717476"/>
+                <a:ext cx="144462" cy="271462"/>
+              </p:xfrm>
+              <a:graphic>
+                <a:graphicData uri="http://schemas.openxmlformats.org/presentationml/2006/ole">
+                  <mc:AlternateContent xmlns:mc="http://schemas.openxmlformats.org/markup-compatibility/2006">
+                    <mc:Choice xmlns:v="urn:schemas-microsoft-com:vml" Requires="v">
+                      <p:oleObj name="AxMath" r:id="rId17" imgW="99720" imgH="188280" progId="Equation.AxMath">
+                        <p:embed/>
+                      </p:oleObj>
+                    </mc:Choice>
+                    <mc:Fallback>
+                      <p:oleObj name="AxMath" r:id="rId17" imgW="99720" imgH="188280" progId="Equation.AxMath">
+                        <p:embed/>
+                        <p:pic>
+                          <p:nvPicPr>
+                            <p:cNvPr id="86" name="对象 85">
+                              <a:extLst>
+                                <a:ext uri="{FF2B5EF4-FFF2-40B4-BE49-F238E27FC236}">
+                                  <a16:creationId xmlns:a16="http://schemas.microsoft.com/office/drawing/2014/main" id="{E64AF96C-08A4-7A9B-BBF7-53490548A712}"/>
+                                </a:ext>
+                              </a:extLst>
+                            </p:cNvPr>
+                            <p:cNvPicPr/>
+                            <p:nvPr/>
+                          </p:nvPicPr>
+                          <p:blipFill>
+                            <a:blip r:embed="rId11"/>
+                            <a:stretch>
+                              <a:fillRect/>
+                            </a:stretch>
+                          </p:blipFill>
+                          <p:spPr>
+                            <a:xfrm>
+                              <a:off x="4330152" y="3717476"/>
+                              <a:ext cx="144462" cy="271462"/>
+                            </a:xfrm>
+                            <a:prstGeom prst="rect">
+                              <a:avLst/>
+                            </a:prstGeom>
+                          </p:spPr>
+                        </p:pic>
+                      </p:oleObj>
+                    </mc:Fallback>
+                  </mc:AlternateContent>
+                </a:graphicData>
+              </a:graphic>
+            </p:graphicFrame>
+            <p:graphicFrame>
+              <p:nvGraphicFramePr>
+                <p:cNvPr id="101" name="对象 100">
+                  <a:extLst>
+                    <a:ext uri="{FF2B5EF4-FFF2-40B4-BE49-F238E27FC236}">
+                      <a16:creationId xmlns:a16="http://schemas.microsoft.com/office/drawing/2014/main" id="{0BE68E2E-9DBC-709A-6DA2-415F76F56E33}"/>
+                    </a:ext>
+                  </a:extLst>
+                </p:cNvPr>
+                <p:cNvGraphicFramePr>
+                  <a:graphicFrameLocks noChangeAspect="1"/>
+                </p:cNvGraphicFramePr>
+                <p:nvPr>
+                  <p:extLst>
+                    <p:ext uri="{D42A27DB-BD31-4B8C-83A1-F6EECF244321}">
+                      <p14:modId xmlns:p14="http://schemas.microsoft.com/office/powerpoint/2010/main" val="3072308130"/>
+                    </p:ext>
+                  </p:extLst>
+                </p:nvPr>
+              </p:nvGraphicFramePr>
+              <p:xfrm>
+                <a:off x="1557293" y="2563061"/>
+                <a:ext cx="174625" cy="274638"/>
+              </p:xfrm>
+              <a:graphic>
+                <a:graphicData uri="http://schemas.openxmlformats.org/presentationml/2006/ole">
+                  <mc:AlternateContent xmlns:mc="http://schemas.openxmlformats.org/markup-compatibility/2006">
+                    <mc:Choice xmlns:v="urn:schemas-microsoft-com:vml" Requires="v">
+                      <p:oleObj name="AxMath" r:id="rId18" imgW="120600" imgH="189720" progId="Equation.AxMath">
+                        <p:embed/>
+                      </p:oleObj>
+                    </mc:Choice>
+                    <mc:Fallback>
+                      <p:oleObj name="AxMath" r:id="rId18" imgW="120600" imgH="189720" progId="Equation.AxMath">
+                        <p:embed/>
+                        <p:pic>
+                          <p:nvPicPr>
+                            <p:cNvPr id="87" name="对象 86">
+                              <a:extLst>
+                                <a:ext uri="{FF2B5EF4-FFF2-40B4-BE49-F238E27FC236}">
+                                  <a16:creationId xmlns:a16="http://schemas.microsoft.com/office/drawing/2014/main" id="{5C4FACDE-6632-32EB-2385-4CFBE395BE5F}"/>
+                                </a:ext>
+                              </a:extLst>
+                            </p:cNvPr>
+                            <p:cNvPicPr/>
+                            <p:nvPr/>
+                          </p:nvPicPr>
+                          <p:blipFill>
+                            <a:blip r:embed="rId13"/>
+                            <a:stretch>
+                              <a:fillRect/>
+                            </a:stretch>
+                          </p:blipFill>
+                          <p:spPr>
+                            <a:xfrm>
+                              <a:off x="1557293" y="2563061"/>
+                              <a:ext cx="174625" cy="274638"/>
+                            </a:xfrm>
+                            <a:prstGeom prst="rect">
+                              <a:avLst/>
+                            </a:prstGeom>
+                          </p:spPr>
+                        </p:pic>
+                      </p:oleObj>
+                    </mc:Fallback>
+                  </mc:AlternateContent>
+                </a:graphicData>
+              </a:graphic>
+            </p:graphicFrame>
+            <p:sp>
+              <p:nvSpPr>
+                <p:cNvPr id="102" name="文本框 101">
+                  <a:extLst>
+                    <a:ext uri="{FF2B5EF4-FFF2-40B4-BE49-F238E27FC236}">
+                      <a16:creationId xmlns:a16="http://schemas.microsoft.com/office/drawing/2014/main" id="{E138564F-C4A0-DE93-018F-1BF90628716B}"/>
+                    </a:ext>
+                  </a:extLst>
+                </p:cNvPr>
+                <p:cNvSpPr txBox="1"/>
+                <p:nvPr/>
+              </p:nvSpPr>
+              <p:spPr>
+                <a:xfrm>
+                  <a:off x="2653214" y="2564904"/>
+                  <a:ext cx="274434" cy="307777"/>
+                </a:xfrm>
+                <a:prstGeom prst="rect">
+                  <a:avLst/>
+                </a:prstGeom>
+                <a:noFill/>
+              </p:spPr>
+              <p:txBody>
+                <a:bodyPr wrap="none" rtlCol="0">
+                  <a:spAutoFit/>
+                </a:bodyPr>
+                <a:lstStyle/>
+                <a:p>
+                  <a:r>
+                    <a:rPr lang="en-US" altLang="zh-CN" sz="1400" dirty="0">
+                      <a:solidFill>
+                        <a:srgbClr val="FF0000"/>
+                      </a:solidFill>
+                      <a:latin typeface="Symbol Tiger Expert" panose="05050102010706020507" pitchFamily="18" charset="2"/>
+                      <a:ea typeface="阿里巴巴普惠体 Medium" panose="00020600040101010101" pitchFamily="18" charset="-122"/>
+                      <a:cs typeface="Times New Roman" panose="02020603050405020304" pitchFamily="18" charset="0"/>
+                    </a:rPr>
+                    <a:t>?</a:t>
+                  </a:r>
+                  <a:endParaRPr lang="zh-CN" altLang="en-US" sz="1400" dirty="0">
+                    <a:solidFill>
+                      <a:srgbClr val="FF0000"/>
+                    </a:solidFill>
+                    <a:latin typeface="Symbol Tiger Expert" panose="05050102010706020507" pitchFamily="18" charset="2"/>
+                    <a:ea typeface="阿里巴巴普惠体 Medium" panose="00020600040101010101" pitchFamily="18" charset="-122"/>
+                    <a:cs typeface="Times New Roman" panose="02020603050405020304" pitchFamily="18" charset="0"/>
+                  </a:endParaRPr>
+                </a:p>
+              </p:txBody>
+            </p:sp>
+            <p:cxnSp>
+              <p:nvCxnSpPr>
+                <p:cNvPr id="70" name="直接连接符 69">
+                  <a:extLst>
+                    <a:ext uri="{FF2B5EF4-FFF2-40B4-BE49-F238E27FC236}">
+                      <a16:creationId xmlns:a16="http://schemas.microsoft.com/office/drawing/2014/main" id="{BF381B9F-B628-C036-9980-01CAC003D900}"/>
+                    </a:ext>
+                  </a:extLst>
+                </p:cNvPr>
+                <p:cNvCxnSpPr>
+                  <a:cxnSpLocks/>
+                </p:cNvCxnSpPr>
+                <p:nvPr/>
+              </p:nvCxnSpPr>
+              <p:spPr>
+                <a:xfrm>
+                  <a:off x="3208789" y="1988590"/>
+                  <a:ext cx="0" cy="360040"/>
+                </a:xfrm>
+                <a:prstGeom prst="line">
+                  <a:avLst/>
+                </a:prstGeom>
+                <a:ln w="19050">
+                  <a:solidFill>
+                    <a:schemeClr val="accent1">
+                      <a:lumMod val="60000"/>
+                      <a:lumOff val="40000"/>
+                    </a:schemeClr>
+                  </a:solidFill>
+                  <a:prstDash val="dash"/>
+                  <a:headEnd type="triangle" w="med" len="med"/>
+                  <a:tailEnd type="triangle" w="med" len="med"/>
+                </a:ln>
+              </p:spPr>
+              <p:style>
+                <a:lnRef idx="1">
+                  <a:schemeClr val="dk1"/>
+                </a:lnRef>
+                <a:fillRef idx="0">
+                  <a:schemeClr val="dk1"/>
+                </a:fillRef>
+                <a:effectRef idx="0">
+                  <a:schemeClr val="dk1"/>
+                </a:effectRef>
+                <a:fontRef idx="minor">
+                  <a:schemeClr val="tx1"/>
+                </a:fontRef>
+              </p:style>
+            </p:cxnSp>
+            <p:sp>
+              <p:nvSpPr>
+                <p:cNvPr id="104" name="文本框 103">
+                  <a:extLst>
+                    <a:ext uri="{FF2B5EF4-FFF2-40B4-BE49-F238E27FC236}">
+                      <a16:creationId xmlns:a16="http://schemas.microsoft.com/office/drawing/2014/main" id="{B29A59DB-2D59-FE72-4F9F-1F5A76170D89}"/>
+                    </a:ext>
+                  </a:extLst>
+                </p:cNvPr>
+                <p:cNvSpPr txBox="1"/>
+                <p:nvPr/>
+              </p:nvSpPr>
+              <p:spPr>
+                <a:xfrm>
+                  <a:off x="3192310" y="2034531"/>
+                  <a:ext cx="453970" cy="276999"/>
+                </a:xfrm>
+                <a:prstGeom prst="rect">
+                  <a:avLst/>
+                </a:prstGeom>
+                <a:noFill/>
+              </p:spPr>
+              <p:txBody>
+                <a:bodyPr wrap="none" rtlCol="0">
+                  <a:spAutoFit/>
+                </a:bodyPr>
+                <a:lstStyle/>
+                <a:p>
+                  <a:r>
+                    <a:rPr lang="en-US" altLang="zh-CN" sz="1200" dirty="0">
+                      <a:latin typeface="Times New Roman" panose="02020603050405020304" pitchFamily="18" charset="0"/>
+                      <a:ea typeface="阿里巴巴普惠体 Medium" panose="00020600040101010101" pitchFamily="18" charset="-122"/>
+                      <a:cs typeface="Times New Roman" panose="02020603050405020304" pitchFamily="18" charset="0"/>
+                    </a:rPr>
+                    <a:t>0.15</a:t>
+                  </a:r>
+                  <a:endParaRPr lang="zh-CN" altLang="en-US" sz="1200" dirty="0">
+                    <a:latin typeface="Times New Roman" panose="02020603050405020304" pitchFamily="18" charset="0"/>
+                    <a:ea typeface="阿里巴巴普惠体 Medium" panose="00020600040101010101" pitchFamily="18" charset="-122"/>
+                    <a:cs typeface="Times New Roman" panose="02020603050405020304" pitchFamily="18" charset="0"/>
+                  </a:endParaRPr>
+                </a:p>
+              </p:txBody>
+            </p:sp>
+            <p:cxnSp>
+              <p:nvCxnSpPr>
+                <p:cNvPr id="64" name="直接连接符 63">
+                  <a:extLst>
+                    <a:ext uri="{FF2B5EF4-FFF2-40B4-BE49-F238E27FC236}">
+                      <a16:creationId xmlns:a16="http://schemas.microsoft.com/office/drawing/2014/main" id="{B68F16C1-1E63-479A-510C-D79210E972EF}"/>
+                    </a:ext>
+                  </a:extLst>
+                </p:cNvPr>
+                <p:cNvCxnSpPr>
+                  <a:cxnSpLocks/>
+                </p:cNvCxnSpPr>
+                <p:nvPr/>
+              </p:nvCxnSpPr>
+              <p:spPr>
+                <a:xfrm>
+                  <a:off x="2705843" y="2348630"/>
+                  <a:ext cx="0" cy="1079249"/>
+                </a:xfrm>
+                <a:prstGeom prst="line">
+                  <a:avLst/>
+                </a:prstGeom>
+                <a:ln w="19050">
+                  <a:solidFill>
+                    <a:schemeClr val="accent1">
+                      <a:lumMod val="60000"/>
+                      <a:lumOff val="40000"/>
+                    </a:schemeClr>
+                  </a:solidFill>
+                  <a:prstDash val="dash"/>
+                  <a:headEnd type="triangle" w="med" len="med"/>
+                  <a:tailEnd type="triangle" w="med" len="med"/>
+                </a:ln>
+              </p:spPr>
+              <p:style>
+                <a:lnRef idx="1">
+                  <a:schemeClr val="dk1"/>
+                </a:lnRef>
+                <a:fillRef idx="0">
+                  <a:schemeClr val="dk1"/>
+                </a:fillRef>
+                <a:effectRef idx="0">
+                  <a:schemeClr val="dk1"/>
+                </a:effectRef>
+                <a:fontRef idx="minor">
+                  <a:schemeClr val="tx1"/>
+                </a:fontRef>
+              </p:style>
+            </p:cxnSp>
+            <p:cxnSp>
+              <p:nvCxnSpPr>
+                <p:cNvPr id="73" name="直接连接符 72">
+                  <a:extLst>
+                    <a:ext uri="{FF2B5EF4-FFF2-40B4-BE49-F238E27FC236}">
+                      <a16:creationId xmlns:a16="http://schemas.microsoft.com/office/drawing/2014/main" id="{8B7A47D0-C09F-8E54-3D81-217C7E11248B}"/>
+                    </a:ext>
+                  </a:extLst>
+                </p:cNvPr>
+                <p:cNvCxnSpPr>
+                  <a:cxnSpLocks/>
+                </p:cNvCxnSpPr>
+                <p:nvPr/>
+              </p:nvCxnSpPr>
+              <p:spPr>
+                <a:xfrm>
+                  <a:off x="2205751" y="3427879"/>
+                  <a:ext cx="0" cy="432921"/>
+                </a:xfrm>
+                <a:prstGeom prst="line">
+                  <a:avLst/>
+                </a:prstGeom>
+                <a:ln w="19050">
+                  <a:solidFill>
+                    <a:schemeClr val="accent1">
+                      <a:lumMod val="60000"/>
+                      <a:lumOff val="40000"/>
+                    </a:schemeClr>
+                  </a:solidFill>
+                  <a:prstDash val="dash"/>
+                  <a:headEnd type="triangle" w="med" len="med"/>
+                  <a:tailEnd type="triangle" w="med" len="med"/>
+                </a:ln>
+              </p:spPr>
+              <p:style>
+                <a:lnRef idx="1">
+                  <a:schemeClr val="dk1"/>
+                </a:lnRef>
+                <a:fillRef idx="0">
+                  <a:schemeClr val="dk1"/>
+                </a:fillRef>
+                <a:effectRef idx="0">
+                  <a:schemeClr val="dk1"/>
+                </a:effectRef>
+                <a:fontRef idx="minor">
+                  <a:schemeClr val="tx1"/>
+                </a:fontRef>
+              </p:style>
+            </p:cxnSp>
+            <p:cxnSp>
+              <p:nvCxnSpPr>
+                <p:cNvPr id="99" name="直接连接符 98">
+                  <a:extLst>
+                    <a:ext uri="{FF2B5EF4-FFF2-40B4-BE49-F238E27FC236}">
+                      <a16:creationId xmlns:a16="http://schemas.microsoft.com/office/drawing/2014/main" id="{C97FCE9E-F3BE-E688-03C4-A090C5563F42}"/>
+                    </a:ext>
+                  </a:extLst>
+                </p:cNvPr>
+                <p:cNvCxnSpPr>
+                  <a:cxnSpLocks/>
+                </p:cNvCxnSpPr>
+                <p:nvPr/>
+              </p:nvCxnSpPr>
+              <p:spPr>
+                <a:xfrm flipH="1">
+                  <a:off x="1773266" y="2708640"/>
+                  <a:ext cx="931821" cy="0"/>
+                </a:xfrm>
+                <a:prstGeom prst="line">
+                  <a:avLst/>
+                </a:prstGeom>
+                <a:ln w="19050">
+                  <a:solidFill>
+                    <a:srgbClr val="FF0000"/>
+                  </a:solidFill>
+                  <a:prstDash val="solid"/>
+                  <a:headEnd type="oval" w="sm" len="sm"/>
+                  <a:tailEnd type="oval" w="sm" len="sm"/>
+                </a:ln>
+              </p:spPr>
+              <p:style>
+                <a:lnRef idx="1">
+                  <a:schemeClr val="dk1"/>
+                </a:lnRef>
+                <a:fillRef idx="0">
+                  <a:schemeClr val="dk1"/>
+                </a:fillRef>
+                <a:effectRef idx="0">
+                  <a:schemeClr val="dk1"/>
+                </a:effectRef>
+                <a:fontRef idx="minor">
+                  <a:schemeClr val="tx1"/>
+                </a:fontRef>
+              </p:style>
+            </p:cxnSp>
+          </p:grpSp>
+        </p:grpSp>
+      </p:grpSp>
+    </p:spTree>
+    <p:extLst>
+      <p:ext uri="{BB962C8B-B14F-4D97-AF65-F5344CB8AC3E}">
+        <p14:creationId xmlns:p14="http://schemas.microsoft.com/office/powerpoint/2010/main" val="2257802441"/>
+      </p:ext>
+    </p:extLst>
+  </p:cSld>
+  <p:clrMapOvr>
+    <a:masterClrMapping/>
+  </p:clrMapOvr>
+</p:sld>
+</file>
+
 <file path=ppt/theme/theme1.xml><?xml version="1.0" encoding="utf-8"?>
 <a:theme xmlns:a="http://schemas.openxmlformats.org/drawingml/2006/main" name="Office 主题​​">
   <a:themeElements>

</xml_diff>